<commit_message>
Fall'24 semester week07 updates.
</commit_message>
<xml_diff>
--- a/Data Structures (Theory)/Slides/Ms. Rafia's GCR/DSA Week#04-05 Ms.Rafia.pptx
+++ b/Data Structures (Theory)/Slides/Ms. Rafia's GCR/DSA Week#04-05 Ms.Rafia.pptx
@@ -5,7 +5,7 @@
     <p:sldMasterId id="2147483648" r:id="rId1"/>
   </p:sldMasterIdLst>
   <p:notesMasterIdLst>
-    <p:notesMasterId r:id="rId45"/>
+    <p:notesMasterId r:id="rId52"/>
   </p:notesMasterIdLst>
   <p:sldIdLst>
     <p:sldId id="256" r:id="rId2"/>
@@ -16,49 +16,56 @@
     <p:sldId id="317" r:id="rId7"/>
     <p:sldId id="326" r:id="rId8"/>
     <p:sldId id="318" r:id="rId9"/>
-    <p:sldId id="338" r:id="rId10"/>
-    <p:sldId id="316" r:id="rId11"/>
-    <p:sldId id="339" r:id="rId12"/>
-    <p:sldId id="333" r:id="rId13"/>
-    <p:sldId id="334" r:id="rId14"/>
+    <p:sldId id="356" r:id="rId10"/>
+    <p:sldId id="358" r:id="rId11"/>
+    <p:sldId id="357" r:id="rId12"/>
+    <p:sldId id="338" r:id="rId13"/>
+    <p:sldId id="316" r:id="rId14"/>
     <p:sldId id="341" r:id="rId15"/>
-    <p:sldId id="335" r:id="rId16"/>
-    <p:sldId id="336" r:id="rId17"/>
-    <p:sldId id="337" r:id="rId18"/>
-    <p:sldId id="332" r:id="rId19"/>
-    <p:sldId id="319" r:id="rId20"/>
-    <p:sldId id="330" r:id="rId21"/>
-    <p:sldId id="331" r:id="rId22"/>
-    <p:sldId id="321" r:id="rId23"/>
-    <p:sldId id="322" r:id="rId24"/>
-    <p:sldId id="320" r:id="rId25"/>
-    <p:sldId id="350" r:id="rId26"/>
-    <p:sldId id="349" r:id="rId27"/>
-    <p:sldId id="351" r:id="rId28"/>
-    <p:sldId id="352" r:id="rId29"/>
-    <p:sldId id="353" r:id="rId30"/>
-    <p:sldId id="354" r:id="rId31"/>
-    <p:sldId id="355" r:id="rId32"/>
-    <p:sldId id="323" r:id="rId33"/>
-    <p:sldId id="324" r:id="rId34"/>
-    <p:sldId id="325" r:id="rId35"/>
-    <p:sldId id="314" r:id="rId36"/>
-    <p:sldId id="342" r:id="rId37"/>
-    <p:sldId id="348" r:id="rId38"/>
-    <p:sldId id="343" r:id="rId39"/>
-    <p:sldId id="344" r:id="rId40"/>
-    <p:sldId id="345" r:id="rId41"/>
-    <p:sldId id="346" r:id="rId42"/>
-    <p:sldId id="347" r:id="rId43"/>
-    <p:sldId id="283" r:id="rId44"/>
+    <p:sldId id="333" r:id="rId16"/>
+    <p:sldId id="334" r:id="rId17"/>
+    <p:sldId id="335" r:id="rId18"/>
+    <p:sldId id="339" r:id="rId19"/>
+    <p:sldId id="336" r:id="rId20"/>
+    <p:sldId id="337" r:id="rId21"/>
+    <p:sldId id="332" r:id="rId22"/>
+    <p:sldId id="359" r:id="rId23"/>
+    <p:sldId id="360" r:id="rId24"/>
+    <p:sldId id="361" r:id="rId25"/>
+    <p:sldId id="362" r:id="rId26"/>
+    <p:sldId id="319" r:id="rId27"/>
+    <p:sldId id="330" r:id="rId28"/>
+    <p:sldId id="331" r:id="rId29"/>
+    <p:sldId id="321" r:id="rId30"/>
+    <p:sldId id="322" r:id="rId31"/>
+    <p:sldId id="320" r:id="rId32"/>
+    <p:sldId id="350" r:id="rId33"/>
+    <p:sldId id="349" r:id="rId34"/>
+    <p:sldId id="351" r:id="rId35"/>
+    <p:sldId id="352" r:id="rId36"/>
+    <p:sldId id="353" r:id="rId37"/>
+    <p:sldId id="354" r:id="rId38"/>
+    <p:sldId id="355" r:id="rId39"/>
+    <p:sldId id="323" r:id="rId40"/>
+    <p:sldId id="324" r:id="rId41"/>
+    <p:sldId id="325" r:id="rId42"/>
+    <p:sldId id="314" r:id="rId43"/>
+    <p:sldId id="342" r:id="rId44"/>
+    <p:sldId id="348" r:id="rId45"/>
+    <p:sldId id="343" r:id="rId46"/>
+    <p:sldId id="344" r:id="rId47"/>
+    <p:sldId id="345" r:id="rId48"/>
+    <p:sldId id="346" r:id="rId49"/>
+    <p:sldId id="347" r:id="rId50"/>
+    <p:sldId id="283" r:id="rId51"/>
   </p:sldIdLst>
   <p:sldSz cx="12192000" cy="6858000"/>
   <p:notesSz cx="6858000" cy="9144000"/>
   <p:embeddedFontLst>
     <p:embeddedFont>
       <p:font typeface="Play" panose="020B0604020202020204" charset="0"/>
-      <p:regular r:id="rId46"/>
-      <p:bold r:id="rId47"/>
+      <p:regular r:id="rId53"/>
+      <p:bold r:id="rId54"/>
     </p:embeddedFont>
   </p:embeddedFontLst>
   <p:defaultTextStyle>
@@ -295,7 +302,7 @@
       <p15:sldGuideLst xmlns:p15="http://schemas.microsoft.com/office/powerpoint/2012/main"/>
     </p:ext>
     <p:ext uri="GoogleSlidesCustomDataVersion2">
-      <go:slidesCustomData xmlns:go="http://customooxmlschemas.google.com/" xmlns:ahyp="http://schemas.microsoft.com/office/drawing/2018/hyperlinkcolor" xmlns:p15="http://schemas.microsoft.com/office/powerpoint/2012/main" xmlns:p14="http://schemas.microsoft.com/office/powerpoint/2010/main" xmlns:com="http://schemas.openxmlformats.org/drawingml/2006/compatibility" xmlns:pvml="urn:schemas-microsoft-com:office:powerpoint" xmlns:v="urn:schemas-microsoft-com:vml" xmlns:o="urn:schemas-microsoft-com:office:office" xmlns:dgm="http://schemas.openxmlformats.org/drawingml/2006/diagram" xmlns:c="http://schemas.openxmlformats.org/drawingml/2006/chart" xmlns:mv="urn:schemas-microsoft-com:mac:vml" xmlns:mc="http://schemas.openxmlformats.org/markup-compatibility/2006" xmlns="" r:id="rId52" roundtripDataSignature="AMtx7mj2GURnwsCBBywJT6mr/DXGUWAX7g=="/>
+      <go:slidesCustomData xmlns:go="http://customooxmlschemas.google.com/" xmlns:ahyp="http://schemas.microsoft.com/office/drawing/2018/hyperlinkcolor" xmlns:p15="http://schemas.microsoft.com/office/powerpoint/2012/main" xmlns:p14="http://schemas.microsoft.com/office/powerpoint/2010/main" xmlns:com="http://schemas.openxmlformats.org/drawingml/2006/compatibility" xmlns:pvml="urn:schemas-microsoft-com:office:powerpoint" xmlns:v="urn:schemas-microsoft-com:vml" xmlns:o="urn:schemas-microsoft-com:office:office" xmlns:dgm="http://schemas.openxmlformats.org/drawingml/2006/diagram" xmlns:c="http://schemas.openxmlformats.org/drawingml/2006/chart" xmlns:mv="urn:schemas-microsoft-com:mac:vml" xmlns:mc="http://schemas.openxmlformats.org/markup-compatibility/2006" xmlns="" r:id="rId55" roundtripDataSignature="AMtx7mj2GURnwsCBBywJT6mr/DXGUWAX7g=="/>
     </p:ext>
   </p:extLst>
 </p:presentation>
@@ -1976,7 +1983,7 @@
                 <a:cs typeface="Arial"/>
                 <a:sym typeface="Arial"/>
               </a:rPr>
-              <a:t>22</a:t>
+              <a:t>29</a:t>
             </a:fld>
             <a:endParaRPr lang="en-US" sz="1200" b="0" i="0" u="none" strike="noStrike" cap="none">
               <a:solidFill>
@@ -2140,7 +2147,7 @@
             </a:pPr>
             <a:fld id="{00000000-1234-1234-1234-123412341234}" type="slidenum">
               <a:rPr lang="en-US"/>
-              <a:t>43</a:t>
+              <a:t>50</a:t>
             </a:fld>
             <a:endParaRPr/>
           </a:p>
@@ -13884,6 +13891,336 @@
           <a:lstStyle/>
           <a:p>
             <a:r>
+              <a:rPr lang="en-US" dirty="0"/>
+              <a:t>Stack: resizing-array implementation</a:t>
+            </a:r>
+          </a:p>
+        </p:txBody>
+      </p:sp>
+      <p:sp>
+        <p:nvSpPr>
+          <p:cNvPr id="3" name="Text Placeholder 2"/>
+          <p:cNvSpPr>
+            <a:spLocks noGrp="1"/>
+          </p:cNvSpPr>
+          <p:nvPr>
+            <p:ph type="body" idx="1"/>
+          </p:nvPr>
+        </p:nvSpPr>
+        <p:spPr/>
+        <p:txBody>
+          <a:bodyPr/>
+          <a:lstStyle/>
+          <a:p>
+            <a:endParaRPr lang="en-US"/>
+          </a:p>
+        </p:txBody>
+      </p:sp>
+      <p:pic>
+        <p:nvPicPr>
+          <p:cNvPr id="4" name="Picture 3"/>
+          <p:cNvPicPr>
+            <a:picLocks noChangeAspect="1"/>
+          </p:cNvPicPr>
+          <p:nvPr/>
+        </p:nvPicPr>
+        <p:blipFill rotWithShape="1">
+          <a:blip r:embed="rId2"/>
+          <a:srcRect b="65706"/>
+          <a:stretch/>
+        </p:blipFill>
+        <p:spPr>
+          <a:xfrm>
+            <a:off x="1037256" y="3672512"/>
+            <a:ext cx="9488224" cy="1587746"/>
+          </a:xfrm>
+          <a:prstGeom prst="rect">
+            <a:avLst/>
+          </a:prstGeom>
+        </p:spPr>
+      </p:pic>
+    </p:spTree>
+    <p:extLst>
+      <p:ext uri="{BB962C8B-B14F-4D97-AF65-F5344CB8AC3E}">
+        <p14:creationId xmlns:p14="http://schemas.microsoft.com/office/powerpoint/2010/main" val="1788294167"/>
+      </p:ext>
+    </p:extLst>
+  </p:cSld>
+  <p:clrMapOvr>
+    <a:masterClrMapping/>
+  </p:clrMapOvr>
+  <p:timing>
+    <p:tnLst>
+      <p:par>
+        <p:cTn id="1" dur="indefinite" restart="never" nodeType="tmRoot"/>
+      </p:par>
+    </p:tnLst>
+  </p:timing>
+</p:sld>
+</file>
+
+<file path=ppt/slides/slide11.xml><?xml version="1.0" encoding="utf-8"?>
+<p:sld xmlns:a="http://schemas.openxmlformats.org/drawingml/2006/main" xmlns:r="http://schemas.openxmlformats.org/officeDocument/2006/relationships" xmlns:p="http://schemas.openxmlformats.org/presentationml/2006/main">
+  <p:cSld>
+    <p:spTree>
+      <p:nvGrpSpPr>
+        <p:cNvPr id="1" name=""/>
+        <p:cNvGrpSpPr/>
+        <p:nvPr/>
+      </p:nvGrpSpPr>
+      <p:grpSpPr>
+        <a:xfrm>
+          <a:off x="0" y="0"/>
+          <a:ext cx="0" cy="0"/>
+          <a:chOff x="0" y="0"/>
+          <a:chExt cx="0" cy="0"/>
+        </a:xfrm>
+      </p:grpSpPr>
+      <p:sp>
+        <p:nvSpPr>
+          <p:cNvPr id="2" name="Title 1"/>
+          <p:cNvSpPr>
+            <a:spLocks noGrp="1"/>
+          </p:cNvSpPr>
+          <p:nvPr>
+            <p:ph type="title"/>
+          </p:nvPr>
+        </p:nvSpPr>
+        <p:spPr/>
+        <p:txBody>
+          <a:bodyPr/>
+          <a:lstStyle/>
+          <a:p>
+            <a:r>
+              <a:rPr lang="en-US" dirty="0"/>
+              <a:t>Application of Stack in Data Structure are as following:</a:t>
+            </a:r>
+          </a:p>
+        </p:txBody>
+      </p:sp>
+      <p:sp>
+        <p:nvSpPr>
+          <p:cNvPr id="3" name="Text Placeholder 2"/>
+          <p:cNvSpPr>
+            <a:spLocks noGrp="1"/>
+          </p:cNvSpPr>
+          <p:nvPr>
+            <p:ph type="body" idx="1"/>
+          </p:nvPr>
+        </p:nvSpPr>
+        <p:spPr/>
+        <p:txBody>
+          <a:bodyPr>
+            <a:normAutofit lnSpcReduction="10000"/>
+          </a:bodyPr>
+          <a:lstStyle/>
+          <a:p>
+            <a:r>
+              <a:rPr lang="en-US" dirty="0"/>
+              <a:t>Recursion.</a:t>
+            </a:r>
+          </a:p>
+          <a:p>
+            <a:r>
+              <a:rPr lang="en-US" dirty="0"/>
+              <a:t>Expression Evaluation and Parsing.</a:t>
+            </a:r>
+          </a:p>
+          <a:p>
+            <a:r>
+              <a:rPr lang="en-US" dirty="0" smtClean="0"/>
+              <a:t>Undo/Redo </a:t>
+            </a:r>
+            <a:r>
+              <a:rPr lang="en-US" dirty="0"/>
+              <a:t>Operations.</a:t>
+            </a:r>
+          </a:p>
+          <a:p>
+            <a:r>
+              <a:rPr lang="en-US" dirty="0"/>
+              <a:t>Browser History.</a:t>
+            </a:r>
+          </a:p>
+          <a:p>
+            <a:r>
+              <a:rPr lang="en-US" dirty="0"/>
+              <a:t>Function Calls</a:t>
+            </a:r>
+            <a:r>
+              <a:rPr lang="en-US" dirty="0" smtClean="0"/>
+              <a:t>.</a:t>
+            </a:r>
+          </a:p>
+          <a:p>
+            <a:r>
+              <a:rPr lang="en-US" dirty="0"/>
+              <a:t>Depth-First Search (DFS)</a:t>
+            </a:r>
+          </a:p>
+          <a:p>
+            <a:r>
+              <a:rPr lang="en-US" dirty="0"/>
+              <a:t>Backtracking</a:t>
+            </a:r>
+          </a:p>
+          <a:p>
+            <a:r>
+              <a:rPr lang="en-US" dirty="0"/>
+              <a:t>Delimiter Checking</a:t>
+            </a:r>
+          </a:p>
+          <a:p>
+            <a:r>
+              <a:rPr lang="en-US" dirty="0"/>
+              <a:t>Reverse a Data</a:t>
+            </a:r>
+          </a:p>
+          <a:p>
+            <a:endParaRPr lang="en-US" dirty="0"/>
+          </a:p>
+        </p:txBody>
+      </p:sp>
+    </p:spTree>
+    <p:extLst>
+      <p:ext uri="{BB962C8B-B14F-4D97-AF65-F5344CB8AC3E}">
+        <p14:creationId xmlns:p14="http://schemas.microsoft.com/office/powerpoint/2010/main" val="2682271694"/>
+      </p:ext>
+    </p:extLst>
+  </p:cSld>
+  <p:clrMapOvr>
+    <a:masterClrMapping/>
+  </p:clrMapOvr>
+  <p:timing>
+    <p:tnLst>
+      <p:par>
+        <p:cTn id="1" dur="indefinite" restart="never" nodeType="tmRoot"/>
+      </p:par>
+    </p:tnLst>
+  </p:timing>
+</p:sld>
+</file>
+
+<file path=ppt/slides/slide12.xml><?xml version="1.0" encoding="utf-8"?>
+<p:sld xmlns:a="http://schemas.openxmlformats.org/drawingml/2006/main" xmlns:r="http://schemas.openxmlformats.org/officeDocument/2006/relationships" xmlns:p="http://schemas.openxmlformats.org/presentationml/2006/main">
+  <p:cSld>
+    <p:spTree>
+      <p:nvGrpSpPr>
+        <p:cNvPr id="1" name=""/>
+        <p:cNvGrpSpPr/>
+        <p:nvPr/>
+      </p:nvGrpSpPr>
+      <p:grpSpPr>
+        <a:xfrm>
+          <a:off x="0" y="0"/>
+          <a:ext cx="0" cy="0"/>
+          <a:chOff x="0" y="0"/>
+          <a:chExt cx="0" cy="0"/>
+        </a:xfrm>
+      </p:grpSpPr>
+      <p:sp>
+        <p:nvSpPr>
+          <p:cNvPr id="2" name="Title 1"/>
+          <p:cNvSpPr>
+            <a:spLocks noGrp="1"/>
+          </p:cNvSpPr>
+          <p:nvPr>
+            <p:ph type="title"/>
+          </p:nvPr>
+        </p:nvSpPr>
+        <p:spPr/>
+        <p:txBody>
+          <a:bodyPr/>
+          <a:lstStyle/>
+          <a:p>
+            <a:r>
+              <a:rPr lang="en-US" dirty="0" smtClean="0"/>
+              <a:t>Task</a:t>
+            </a:r>
+            <a:endParaRPr lang="en-US" dirty="0"/>
+          </a:p>
+        </p:txBody>
+      </p:sp>
+      <p:sp>
+        <p:nvSpPr>
+          <p:cNvPr id="3" name="Text Placeholder 2"/>
+          <p:cNvSpPr>
+            <a:spLocks noGrp="1"/>
+          </p:cNvSpPr>
+          <p:nvPr>
+            <p:ph type="body" idx="1"/>
+          </p:nvPr>
+        </p:nvSpPr>
+        <p:spPr/>
+        <p:txBody>
+          <a:bodyPr/>
+          <a:lstStyle/>
+          <a:p>
+            <a:r>
+              <a:rPr lang="en-US" dirty="0"/>
+              <a:t>Reverse </a:t>
+            </a:r>
+            <a:r>
+              <a:rPr lang="en-US" dirty="0" smtClean="0"/>
+              <a:t>a string using stack </a:t>
+            </a:r>
+            <a:endParaRPr lang="en-US" dirty="0"/>
+          </a:p>
+        </p:txBody>
+      </p:sp>
+    </p:spTree>
+    <p:extLst>
+      <p:ext uri="{BB962C8B-B14F-4D97-AF65-F5344CB8AC3E}">
+        <p14:creationId xmlns:p14="http://schemas.microsoft.com/office/powerpoint/2010/main" val="301942146"/>
+      </p:ext>
+    </p:extLst>
+  </p:cSld>
+  <p:clrMapOvr>
+    <a:masterClrMapping/>
+  </p:clrMapOvr>
+  <p:timing>
+    <p:tnLst>
+      <p:par>
+        <p:cTn id="1" dur="indefinite" restart="never" nodeType="tmRoot"/>
+      </p:par>
+    </p:tnLst>
+  </p:timing>
+</p:sld>
+</file>
+
+<file path=ppt/slides/slide13.xml><?xml version="1.0" encoding="utf-8"?>
+<p:sld xmlns:a="http://schemas.openxmlformats.org/drawingml/2006/main" xmlns:r="http://schemas.openxmlformats.org/officeDocument/2006/relationships" xmlns:p="http://schemas.openxmlformats.org/presentationml/2006/main">
+  <p:cSld>
+    <p:spTree>
+      <p:nvGrpSpPr>
+        <p:cNvPr id="1" name=""/>
+        <p:cNvGrpSpPr/>
+        <p:nvPr/>
+      </p:nvGrpSpPr>
+      <p:grpSpPr>
+        <a:xfrm>
+          <a:off x="0" y="0"/>
+          <a:ext cx="0" cy="0"/>
+          <a:chOff x="0" y="0"/>
+          <a:chExt cx="0" cy="0"/>
+        </a:xfrm>
+      </p:grpSpPr>
+      <p:sp>
+        <p:nvSpPr>
+          <p:cNvPr id="2" name="Title 1"/>
+          <p:cNvSpPr>
+            <a:spLocks noGrp="1"/>
+          </p:cNvSpPr>
+          <p:nvPr>
+            <p:ph type="title"/>
+          </p:nvPr>
+        </p:nvSpPr>
+        <p:spPr/>
+        <p:txBody>
+          <a:bodyPr/>
+          <a:lstStyle/>
+          <a:p>
+            <a:r>
               <a:rPr lang="en-US" dirty="0" smtClean="0"/>
               <a:t>Task</a:t>
             </a:r>
@@ -13965,272 +14302,6 @@
     <p:extLst>
       <p:ext uri="{BB962C8B-B14F-4D97-AF65-F5344CB8AC3E}">
         <p14:creationId xmlns:p14="http://schemas.microsoft.com/office/powerpoint/2010/main" val="3816349432"/>
-      </p:ext>
-    </p:extLst>
-  </p:cSld>
-  <p:clrMapOvr>
-    <a:masterClrMapping/>
-  </p:clrMapOvr>
-</p:sld>
-</file>
-
-<file path=ppt/slides/slide11.xml><?xml version="1.0" encoding="utf-8"?>
-<p:sld xmlns:a="http://schemas.openxmlformats.org/drawingml/2006/main" xmlns:r="http://schemas.openxmlformats.org/officeDocument/2006/relationships" xmlns:p="http://schemas.openxmlformats.org/presentationml/2006/main">
-  <p:cSld>
-    <p:spTree>
-      <p:nvGrpSpPr>
-        <p:cNvPr id="1" name=""/>
-        <p:cNvGrpSpPr/>
-        <p:nvPr/>
-      </p:nvGrpSpPr>
-      <p:grpSpPr>
-        <a:xfrm>
-          <a:off x="0" y="0"/>
-          <a:ext cx="0" cy="0"/>
-          <a:chOff x="0" y="0"/>
-          <a:chExt cx="0" cy="0"/>
-        </a:xfrm>
-      </p:grpSpPr>
-      <p:sp>
-        <p:nvSpPr>
-          <p:cNvPr id="2" name="Title 1"/>
-          <p:cNvSpPr>
-            <a:spLocks noGrp="1"/>
-          </p:cNvSpPr>
-          <p:nvPr>
-            <p:ph type="title"/>
-          </p:nvPr>
-        </p:nvSpPr>
-        <p:spPr/>
-        <p:txBody>
-          <a:bodyPr/>
-          <a:lstStyle/>
-          <a:p>
-            <a:r>
-              <a:rPr lang="en-US" dirty="0" smtClean="0"/>
-              <a:t>Code</a:t>
-            </a:r>
-            <a:endParaRPr lang="en-US" dirty="0"/>
-          </a:p>
-        </p:txBody>
-      </p:sp>
-      <p:sp>
-        <p:nvSpPr>
-          <p:cNvPr id="3" name="Text Placeholder 2"/>
-          <p:cNvSpPr>
-            <a:spLocks noGrp="1"/>
-          </p:cNvSpPr>
-          <p:nvPr>
-            <p:ph type="body" idx="1"/>
-          </p:nvPr>
-        </p:nvSpPr>
-        <p:spPr/>
-        <p:txBody>
-          <a:bodyPr/>
-          <a:lstStyle/>
-          <a:p>
-            <a:endParaRPr lang="en-US"/>
-          </a:p>
-        </p:txBody>
-      </p:sp>
-    </p:spTree>
-    <p:extLst>
-      <p:ext uri="{BB962C8B-B14F-4D97-AF65-F5344CB8AC3E}">
-        <p14:creationId xmlns:p14="http://schemas.microsoft.com/office/powerpoint/2010/main" val="3452614181"/>
-      </p:ext>
-    </p:extLst>
-  </p:cSld>
-  <p:clrMapOvr>
-    <a:masterClrMapping/>
-  </p:clrMapOvr>
-</p:sld>
-</file>
-
-<file path=ppt/slides/slide12.xml><?xml version="1.0" encoding="utf-8"?>
-<p:sld xmlns:a="http://schemas.openxmlformats.org/drawingml/2006/main" xmlns:r="http://schemas.openxmlformats.org/officeDocument/2006/relationships" xmlns:p="http://schemas.openxmlformats.org/presentationml/2006/main">
-  <p:cSld>
-    <p:spTree>
-      <p:nvGrpSpPr>
-        <p:cNvPr id="1" name=""/>
-        <p:cNvGrpSpPr/>
-        <p:nvPr/>
-      </p:nvGrpSpPr>
-      <p:grpSpPr>
-        <a:xfrm>
-          <a:off x="0" y="0"/>
-          <a:ext cx="0" cy="0"/>
-          <a:chOff x="0" y="0"/>
-          <a:chExt cx="0" cy="0"/>
-        </a:xfrm>
-      </p:grpSpPr>
-      <p:sp>
-        <p:nvSpPr>
-          <p:cNvPr id="2" name="Title 1"/>
-          <p:cNvSpPr>
-            <a:spLocks noGrp="1"/>
-          </p:cNvSpPr>
-          <p:nvPr>
-            <p:ph type="title"/>
-          </p:nvPr>
-        </p:nvSpPr>
-        <p:spPr/>
-        <p:txBody>
-          <a:bodyPr/>
-          <a:lstStyle/>
-          <a:p>
-            <a:r>
-              <a:rPr lang="en-US" dirty="0"/>
-              <a:t>Balanced Brackets</a:t>
-            </a:r>
-          </a:p>
-        </p:txBody>
-      </p:sp>
-      <p:sp>
-        <p:nvSpPr>
-          <p:cNvPr id="3" name="Text Placeholder 2"/>
-          <p:cNvSpPr>
-            <a:spLocks noGrp="1"/>
-          </p:cNvSpPr>
-          <p:nvPr>
-            <p:ph type="body" idx="1"/>
-          </p:nvPr>
-        </p:nvSpPr>
-        <p:spPr/>
-        <p:txBody>
-          <a:bodyPr/>
-          <a:lstStyle/>
-          <a:p>
-            <a:r>
-              <a:rPr lang="en-US" b="1" dirty="0"/>
-              <a:t>Input:</a:t>
-            </a:r>
-            <a:r>
-              <a:rPr lang="en-US" dirty="0"/>
-              <a:t> A string </a:t>
-            </a:r>
-            <a:r>
-              <a:rPr lang="en-US" dirty="0" err="1"/>
-              <a:t>str</a:t>
-            </a:r>
-            <a:r>
-              <a:rPr lang="en-US" dirty="0"/>
-              <a:t> consisting of ‘(‘, ‘)’, ‘[‘, ‘]’ characters. </a:t>
-            </a:r>
-            <a:endParaRPr lang="en-US" dirty="0" smtClean="0"/>
-          </a:p>
-          <a:p>
-            <a:r>
-              <a:rPr lang="en-US" b="1" dirty="0" smtClean="0"/>
-              <a:t>Output</a:t>
-            </a:r>
-            <a:r>
-              <a:rPr lang="en-US" b="1" dirty="0"/>
-              <a:t>:</a:t>
-            </a:r>
-            <a:r>
-              <a:rPr lang="en-US" dirty="0"/>
-              <a:t> Return whether or not the string’s parentheses and square brackets are balanced. </a:t>
-            </a:r>
-          </a:p>
-        </p:txBody>
-      </p:sp>
-    </p:spTree>
-    <p:extLst>
-      <p:ext uri="{BB962C8B-B14F-4D97-AF65-F5344CB8AC3E}">
-        <p14:creationId xmlns:p14="http://schemas.microsoft.com/office/powerpoint/2010/main" val="754146039"/>
-      </p:ext>
-    </p:extLst>
-  </p:cSld>
-  <p:clrMapOvr>
-    <a:masterClrMapping/>
-  </p:clrMapOvr>
-</p:sld>
-</file>
-
-<file path=ppt/slides/slide13.xml><?xml version="1.0" encoding="utf-8"?>
-<p:sld xmlns:a="http://schemas.openxmlformats.org/drawingml/2006/main" xmlns:r="http://schemas.openxmlformats.org/officeDocument/2006/relationships" xmlns:p="http://schemas.openxmlformats.org/presentationml/2006/main">
-  <p:cSld>
-    <p:spTree>
-      <p:nvGrpSpPr>
-        <p:cNvPr id="1" name=""/>
-        <p:cNvGrpSpPr/>
-        <p:nvPr/>
-      </p:nvGrpSpPr>
-      <p:grpSpPr>
-        <a:xfrm>
-          <a:off x="0" y="0"/>
-          <a:ext cx="0" cy="0"/>
-          <a:chOff x="0" y="0"/>
-          <a:chExt cx="0" cy="0"/>
-        </a:xfrm>
-      </p:grpSpPr>
-      <p:sp>
-        <p:nvSpPr>
-          <p:cNvPr id="2" name="Title 1"/>
-          <p:cNvSpPr>
-            <a:spLocks noGrp="1"/>
-          </p:cNvSpPr>
-          <p:nvPr>
-            <p:ph type="title"/>
-          </p:nvPr>
-        </p:nvSpPr>
-        <p:spPr/>
-        <p:txBody>
-          <a:bodyPr/>
-          <a:lstStyle/>
-          <a:p>
-            <a:r>
-              <a:rPr lang="en-US" dirty="0"/>
-              <a:t>Balanced Brackets</a:t>
-            </a:r>
-          </a:p>
-        </p:txBody>
-      </p:sp>
-      <p:pic>
-        <p:nvPicPr>
-          <p:cNvPr id="3074" name="Picture 2" descr="Valid Multiple Parentheses"/>
-          <p:cNvPicPr>
-            <a:picLocks noChangeAspect="1" noChangeArrowheads="1"/>
-          </p:cNvPicPr>
-          <p:nvPr/>
-        </p:nvPicPr>
-        <p:blipFill>
-          <a:blip r:embed="rId2">
-            <a:extLst>
-              <a:ext uri="{28A0092B-C50C-407E-A947-70E740481C1C}">
-                <a14:useLocalDpi xmlns:a14="http://schemas.microsoft.com/office/drawing/2010/main" val="0"/>
-              </a:ext>
-            </a:extLst>
-          </a:blip>
-          <a:srcRect/>
-          <a:stretch>
-            <a:fillRect/>
-          </a:stretch>
-        </p:blipFill>
-        <p:spPr bwMode="auto">
-          <a:xfrm>
-            <a:off x="2318672" y="2235917"/>
-            <a:ext cx="6949581" cy="3941046"/>
-          </a:xfrm>
-          <a:prstGeom prst="rect">
-            <a:avLst/>
-          </a:prstGeom>
-          <a:noFill/>
-          <a:extLst>
-            <a:ext uri="{909E8E84-426E-40DD-AFC4-6F175D3DCCD1}">
-              <a14:hiddenFill xmlns:a14="http://schemas.microsoft.com/office/drawing/2010/main">
-                <a:solidFill>
-                  <a:srgbClr val="FFFFFF"/>
-                </a:solidFill>
-              </a14:hiddenFill>
-            </a:ext>
-          </a:extLst>
-        </p:spPr>
-      </p:pic>
-    </p:spTree>
-    <p:extLst>
-      <p:ext uri="{BB962C8B-B14F-4D97-AF65-F5344CB8AC3E}">
-        <p14:creationId xmlns:p14="http://schemas.microsoft.com/office/powerpoint/2010/main" val="434868594"/>
       </p:ext>
     </p:extLst>
   </p:cSld>
@@ -14399,44 +14470,64 @@
           <a:p>
             <a:r>
               <a:rPr lang="en-US" dirty="0"/>
-              <a:t>Balanced </a:t>
-            </a:r>
-            <a:r>
-              <a:rPr lang="en-US" dirty="0" smtClean="0"/>
-              <a:t>Brackets Algorithm </a:t>
-            </a:r>
-            <a:endParaRPr lang="en-US" dirty="0"/>
+              <a:t>Balanced Brackets</a:t>
+            </a:r>
           </a:p>
         </p:txBody>
       </p:sp>
-      <p:pic>
-        <p:nvPicPr>
-          <p:cNvPr id="4" name="Picture 3"/>
-          <p:cNvPicPr>
-            <a:picLocks noChangeAspect="1"/>
-          </p:cNvPicPr>
-          <p:nvPr/>
-        </p:nvPicPr>
-        <p:blipFill>
-          <a:blip r:embed="rId2"/>
-          <a:stretch>
-            <a:fillRect/>
-          </a:stretch>
-        </p:blipFill>
-        <p:spPr>
-          <a:xfrm>
-            <a:off x="423814" y="1846494"/>
-            <a:ext cx="11698333" cy="4010585"/>
-          </a:xfrm>
-          <a:prstGeom prst="rect">
-            <a:avLst/>
-          </a:prstGeom>
-        </p:spPr>
-      </p:pic>
+      <p:sp>
+        <p:nvSpPr>
+          <p:cNvPr id="3" name="Text Placeholder 2"/>
+          <p:cNvSpPr>
+            <a:spLocks noGrp="1"/>
+          </p:cNvSpPr>
+          <p:nvPr>
+            <p:ph type="body" idx="1"/>
+          </p:nvPr>
+        </p:nvSpPr>
+        <p:spPr/>
+        <p:txBody>
+          <a:bodyPr/>
+          <a:lstStyle/>
+          <a:p>
+            <a:r>
+              <a:rPr lang="en-US" b="1" dirty="0"/>
+              <a:t>Input:</a:t>
+            </a:r>
+            <a:r>
+              <a:rPr lang="en-US" dirty="0"/>
+              <a:t> A string </a:t>
+            </a:r>
+            <a:r>
+              <a:rPr lang="en-US" dirty="0" err="1"/>
+              <a:t>str</a:t>
+            </a:r>
+            <a:r>
+              <a:rPr lang="en-US" dirty="0"/>
+              <a:t> consisting of ‘(‘, ‘)’, ‘[‘, ‘]’ characters. </a:t>
+            </a:r>
+            <a:endParaRPr lang="en-US" dirty="0" smtClean="0"/>
+          </a:p>
+          <a:p>
+            <a:r>
+              <a:rPr lang="en-US" b="1" dirty="0" smtClean="0"/>
+              <a:t>Output</a:t>
+            </a:r>
+            <a:r>
+              <a:rPr lang="en-US" b="1" dirty="0"/>
+              <a:t>:</a:t>
+            </a:r>
+            <a:r>
+              <a:rPr lang="en-US" dirty="0"/>
+              <a:t> Return whether or not the string’s parentheses and square brackets are balanced. </a:t>
+            </a:r>
+          </a:p>
+        </p:txBody>
+      </p:sp>
     </p:spTree>
     <p:extLst>
       <p:ext uri="{BB962C8B-B14F-4D97-AF65-F5344CB8AC3E}">
-        <p14:creationId xmlns:p14="http://schemas.microsoft.com/office/powerpoint/2010/main" val="893699411"/>
+        <p14:creationId xmlns:p14="http://schemas.microsoft.com/office/powerpoint/2010/main" val="754146039"/>
       </p:ext>
     </p:extLst>
   </p:cSld>
@@ -14479,39 +14570,57 @@
           <a:lstStyle/>
           <a:p>
             <a:r>
-              <a:rPr lang="en-US" dirty="0" smtClean="0"/>
-              <a:t>Question</a:t>
-            </a:r>
-            <a:endParaRPr lang="en-US" dirty="0"/>
+              <a:rPr lang="en-US" dirty="0"/>
+              <a:t>Balanced Brackets</a:t>
+            </a:r>
           </a:p>
         </p:txBody>
       </p:sp>
-      <p:sp>
-        <p:nvSpPr>
-          <p:cNvPr id="3" name="Text Placeholder 2"/>
-          <p:cNvSpPr>
-            <a:spLocks noGrp="1"/>
-          </p:cNvSpPr>
-          <p:nvPr>
-            <p:ph type="body" idx="1"/>
-          </p:nvPr>
-        </p:nvSpPr>
-        <p:spPr/>
-        <p:txBody>
-          <a:bodyPr/>
-          <a:lstStyle/>
-          <a:p>
-            <a:r>
-              <a:rPr lang="en-US" dirty="0"/>
-              <a:t>Given the unbalanced string "()([]", what character is on the top of the stack when the for loop is finished?</a:t>
-            </a:r>
-          </a:p>
-        </p:txBody>
-      </p:sp>
+      <p:pic>
+        <p:nvPicPr>
+          <p:cNvPr id="3074" name="Picture 2" descr="Valid Multiple Parentheses"/>
+          <p:cNvPicPr>
+            <a:picLocks noChangeAspect="1" noChangeArrowheads="1"/>
+          </p:cNvPicPr>
+          <p:nvPr/>
+        </p:nvPicPr>
+        <p:blipFill>
+          <a:blip r:embed="rId2">
+            <a:extLst>
+              <a:ext uri="{28A0092B-C50C-407E-A947-70E740481C1C}">
+                <a14:useLocalDpi xmlns:a14="http://schemas.microsoft.com/office/drawing/2010/main" val="0"/>
+              </a:ext>
+            </a:extLst>
+          </a:blip>
+          <a:srcRect/>
+          <a:stretch>
+            <a:fillRect/>
+          </a:stretch>
+        </p:blipFill>
+        <p:spPr bwMode="auto">
+          <a:xfrm>
+            <a:off x="2318672" y="2235917"/>
+            <a:ext cx="6949581" cy="3941046"/>
+          </a:xfrm>
+          <a:prstGeom prst="rect">
+            <a:avLst/>
+          </a:prstGeom>
+          <a:noFill/>
+          <a:extLst>
+            <a:ext uri="{909E8E84-426E-40DD-AFC4-6F175D3DCCD1}">
+              <a14:hiddenFill xmlns:a14="http://schemas.microsoft.com/office/drawing/2010/main">
+                <a:solidFill>
+                  <a:srgbClr val="FFFFFF"/>
+                </a:solidFill>
+              </a14:hiddenFill>
+            </a:ext>
+          </a:extLst>
+        </p:spPr>
+      </p:pic>
     </p:spTree>
     <p:extLst>
       <p:ext uri="{BB962C8B-B14F-4D97-AF65-F5344CB8AC3E}">
-        <p14:creationId xmlns:p14="http://schemas.microsoft.com/office/powerpoint/2010/main" val="2818638721"/>
+        <p14:creationId xmlns:p14="http://schemas.microsoft.com/office/powerpoint/2010/main" val="434868594"/>
       </p:ext>
     </p:extLst>
   </p:cSld>
@@ -14554,47 +14663,45 @@
           <a:lstStyle/>
           <a:p>
             <a:r>
+              <a:rPr lang="en-US" dirty="0"/>
+              <a:t>Balanced </a:t>
+            </a:r>
+            <a:r>
               <a:rPr lang="en-US" dirty="0" smtClean="0"/>
-              <a:t>Answer!</a:t>
+              <a:t>Brackets Algorithm </a:t>
             </a:r>
             <a:endParaRPr lang="en-US" dirty="0"/>
           </a:p>
         </p:txBody>
       </p:sp>
-      <p:sp>
-        <p:nvSpPr>
-          <p:cNvPr id="3" name="Text Placeholder 2"/>
-          <p:cNvSpPr>
-            <a:spLocks noGrp="1"/>
-          </p:cNvSpPr>
-          <p:nvPr>
-            <p:ph type="body" idx="1"/>
-          </p:nvPr>
-        </p:nvSpPr>
-        <p:spPr/>
-        <p:txBody>
-          <a:bodyPr/>
-          <a:lstStyle/>
-          <a:p>
-            <a:r>
-              <a:rPr lang="en-US" dirty="0"/>
-              <a:t>The stack will contain a single value: '(', The procedure will push the initial '(', and then pop it off to match the ')'. It'll then push the next '(', and the '[', and then pop off the '[' to match the ']'. What remains will the </a:t>
-            </a:r>
-            <a:r>
-              <a:rPr lang="en-US" dirty="0" err="1"/>
-              <a:t>the</a:t>
-            </a:r>
-            <a:r>
-              <a:rPr lang="en-US" dirty="0"/>
-              <a:t> '('.</a:t>
-            </a:r>
-          </a:p>
-        </p:txBody>
-      </p:sp>
+      <p:pic>
+        <p:nvPicPr>
+          <p:cNvPr id="4" name="Picture 3"/>
+          <p:cNvPicPr>
+            <a:picLocks noChangeAspect="1"/>
+          </p:cNvPicPr>
+          <p:nvPr/>
+        </p:nvPicPr>
+        <p:blipFill>
+          <a:blip r:embed="rId2"/>
+          <a:stretch>
+            <a:fillRect/>
+          </a:stretch>
+        </p:blipFill>
+        <p:spPr>
+          <a:xfrm>
+            <a:off x="423814" y="1846494"/>
+            <a:ext cx="11698333" cy="4010585"/>
+          </a:xfrm>
+          <a:prstGeom prst="rect">
+            <a:avLst/>
+          </a:prstGeom>
+        </p:spPr>
+      </p:pic>
     </p:spTree>
     <p:extLst>
       <p:ext uri="{BB962C8B-B14F-4D97-AF65-F5344CB8AC3E}">
-        <p14:creationId xmlns:p14="http://schemas.microsoft.com/office/powerpoint/2010/main" val="2324927297"/>
+        <p14:creationId xmlns:p14="http://schemas.microsoft.com/office/powerpoint/2010/main" val="893699411"/>
       </p:ext>
     </p:extLst>
   </p:cSld>
@@ -14631,11 +14738,20 @@
             <p:ph type="title"/>
           </p:nvPr>
         </p:nvSpPr>
-        <p:spPr/>
+        <p:spPr>
+          <a:xfrm>
+            <a:off x="4471416" y="0"/>
+            <a:ext cx="6333744" cy="1325563"/>
+          </a:xfrm>
+        </p:spPr>
         <p:txBody>
           <a:bodyPr/>
           <a:lstStyle/>
           <a:p>
+            <a:r>
+              <a:rPr lang="en-US" dirty="0" smtClean="0"/>
+              <a:t>Code</a:t>
+            </a:r>
             <a:endParaRPr lang="en-US" dirty="0"/>
           </a:p>
         </p:txBody>
@@ -14655,6 +14771,497 @@
           <a:bodyPr/>
           <a:lstStyle/>
           <a:p>
+            <a:endParaRPr lang="en-US"/>
+          </a:p>
+        </p:txBody>
+      </p:sp>
+      <p:pic>
+        <p:nvPicPr>
+          <p:cNvPr id="4" name="Picture 3"/>
+          <p:cNvPicPr>
+            <a:picLocks noChangeAspect="1"/>
+          </p:cNvPicPr>
+          <p:nvPr/>
+        </p:nvPicPr>
+        <p:blipFill>
+          <a:blip r:embed="rId2"/>
+          <a:stretch>
+            <a:fillRect/>
+          </a:stretch>
+        </p:blipFill>
+        <p:spPr>
+          <a:xfrm>
+            <a:off x="342079" y="3257508"/>
+            <a:ext cx="3026476" cy="3237234"/>
+          </a:xfrm>
+          <a:prstGeom prst="rect">
+            <a:avLst/>
+          </a:prstGeom>
+        </p:spPr>
+      </p:pic>
+      <p:pic>
+        <p:nvPicPr>
+          <p:cNvPr id="5" name="Picture 4"/>
+          <p:cNvPicPr>
+            <a:picLocks noChangeAspect="1"/>
+          </p:cNvPicPr>
+          <p:nvPr/>
+        </p:nvPicPr>
+        <p:blipFill>
+          <a:blip r:embed="rId3"/>
+          <a:stretch>
+            <a:fillRect/>
+          </a:stretch>
+        </p:blipFill>
+        <p:spPr>
+          <a:xfrm>
+            <a:off x="3399035" y="1152144"/>
+            <a:ext cx="3803650" cy="5342598"/>
+          </a:xfrm>
+          <a:prstGeom prst="rect">
+            <a:avLst/>
+          </a:prstGeom>
+        </p:spPr>
+      </p:pic>
+      <p:pic>
+        <p:nvPicPr>
+          <p:cNvPr id="6" name="Picture 5"/>
+          <p:cNvPicPr>
+            <a:picLocks noChangeAspect="1"/>
+          </p:cNvPicPr>
+          <p:nvPr/>
+        </p:nvPicPr>
+        <p:blipFill>
+          <a:blip r:embed="rId4"/>
+          <a:stretch>
+            <a:fillRect/>
+          </a:stretch>
+        </p:blipFill>
+        <p:spPr>
+          <a:xfrm>
+            <a:off x="7233165" y="1457750"/>
+            <a:ext cx="4412850" cy="4936408"/>
+          </a:xfrm>
+          <a:prstGeom prst="rect">
+            <a:avLst/>
+          </a:prstGeom>
+        </p:spPr>
+      </p:pic>
+      <p:pic>
+        <p:nvPicPr>
+          <p:cNvPr id="7" name="Picture 6"/>
+          <p:cNvPicPr>
+            <a:picLocks noChangeAspect="1"/>
+          </p:cNvPicPr>
+          <p:nvPr/>
+        </p:nvPicPr>
+        <p:blipFill>
+          <a:blip r:embed="rId5"/>
+          <a:stretch>
+            <a:fillRect/>
+          </a:stretch>
+        </p:blipFill>
+        <p:spPr>
+          <a:xfrm>
+            <a:off x="155923" y="116059"/>
+            <a:ext cx="3702845" cy="2072169"/>
+          </a:xfrm>
+          <a:prstGeom prst="rect">
+            <a:avLst/>
+          </a:prstGeom>
+        </p:spPr>
+      </p:pic>
+    </p:spTree>
+    <p:extLst>
+      <p:ext uri="{BB962C8B-B14F-4D97-AF65-F5344CB8AC3E}">
+        <p14:creationId xmlns:p14="http://schemas.microsoft.com/office/powerpoint/2010/main" val="3452614181"/>
+      </p:ext>
+    </p:extLst>
+  </p:cSld>
+  <p:clrMapOvr>
+    <a:masterClrMapping/>
+  </p:clrMapOvr>
+</p:sld>
+</file>
+
+<file path=ppt/slides/slide19.xml><?xml version="1.0" encoding="utf-8"?>
+<p:sld xmlns:a="http://schemas.openxmlformats.org/drawingml/2006/main" xmlns:r="http://schemas.openxmlformats.org/officeDocument/2006/relationships" xmlns:p="http://schemas.openxmlformats.org/presentationml/2006/main">
+  <p:cSld>
+    <p:spTree>
+      <p:nvGrpSpPr>
+        <p:cNvPr id="1" name=""/>
+        <p:cNvGrpSpPr/>
+        <p:nvPr/>
+      </p:nvGrpSpPr>
+      <p:grpSpPr>
+        <a:xfrm>
+          <a:off x="0" y="0"/>
+          <a:ext cx="0" cy="0"/>
+          <a:chOff x="0" y="0"/>
+          <a:chExt cx="0" cy="0"/>
+        </a:xfrm>
+      </p:grpSpPr>
+      <p:sp>
+        <p:nvSpPr>
+          <p:cNvPr id="2" name="Title 1"/>
+          <p:cNvSpPr>
+            <a:spLocks noGrp="1"/>
+          </p:cNvSpPr>
+          <p:nvPr>
+            <p:ph type="title"/>
+          </p:nvPr>
+        </p:nvSpPr>
+        <p:spPr/>
+        <p:txBody>
+          <a:bodyPr/>
+          <a:lstStyle/>
+          <a:p>
+            <a:r>
+              <a:rPr lang="en-US" dirty="0" smtClean="0"/>
+              <a:t>Question</a:t>
+            </a:r>
+            <a:endParaRPr lang="en-US" dirty="0"/>
+          </a:p>
+        </p:txBody>
+      </p:sp>
+      <p:sp>
+        <p:nvSpPr>
+          <p:cNvPr id="3" name="Text Placeholder 2"/>
+          <p:cNvSpPr>
+            <a:spLocks noGrp="1"/>
+          </p:cNvSpPr>
+          <p:nvPr>
+            <p:ph type="body" idx="1"/>
+          </p:nvPr>
+        </p:nvSpPr>
+        <p:spPr/>
+        <p:txBody>
+          <a:bodyPr/>
+          <a:lstStyle/>
+          <a:p>
+            <a:r>
+              <a:rPr lang="en-US" dirty="0"/>
+              <a:t>Given the unbalanced string "()([]", what character is on the top of the stack when the for loop is finished?</a:t>
+            </a:r>
+          </a:p>
+        </p:txBody>
+      </p:sp>
+    </p:spTree>
+    <p:extLst>
+      <p:ext uri="{BB962C8B-B14F-4D97-AF65-F5344CB8AC3E}">
+        <p14:creationId xmlns:p14="http://schemas.microsoft.com/office/powerpoint/2010/main" val="2818638721"/>
+      </p:ext>
+    </p:extLst>
+  </p:cSld>
+  <p:clrMapOvr>
+    <a:masterClrMapping/>
+  </p:clrMapOvr>
+</p:sld>
+</file>
+
+<file path=ppt/slides/slide2.xml><?xml version="1.0" encoding="utf-8"?>
+<p:sld xmlns:a="http://schemas.openxmlformats.org/drawingml/2006/main" xmlns:r="http://schemas.openxmlformats.org/officeDocument/2006/relationships" xmlns:p="http://schemas.openxmlformats.org/presentationml/2006/main">
+  <p:cSld>
+    <p:spTree>
+      <p:nvGrpSpPr>
+        <p:cNvPr id="1" name=""/>
+        <p:cNvGrpSpPr/>
+        <p:nvPr/>
+      </p:nvGrpSpPr>
+      <p:grpSpPr>
+        <a:xfrm>
+          <a:off x="0" y="0"/>
+          <a:ext cx="0" cy="0"/>
+          <a:chOff x="0" y="0"/>
+          <a:chExt cx="0" cy="0"/>
+        </a:xfrm>
+      </p:grpSpPr>
+      <p:sp>
+        <p:nvSpPr>
+          <p:cNvPr id="2" name="Title 1"/>
+          <p:cNvSpPr>
+            <a:spLocks noGrp="1"/>
+          </p:cNvSpPr>
+          <p:nvPr>
+            <p:ph type="title"/>
+          </p:nvPr>
+        </p:nvSpPr>
+        <p:spPr/>
+        <p:txBody>
+          <a:bodyPr/>
+          <a:lstStyle/>
+          <a:p>
+            <a:r>
+              <a:rPr lang="en-US" dirty="0" smtClean="0"/>
+              <a:t>Stack</a:t>
+            </a:r>
+            <a:endParaRPr lang="en-US" dirty="0"/>
+          </a:p>
+        </p:txBody>
+      </p:sp>
+      <p:sp>
+        <p:nvSpPr>
+          <p:cNvPr id="3" name="Text Placeholder 2"/>
+          <p:cNvSpPr>
+            <a:spLocks noGrp="1"/>
+          </p:cNvSpPr>
+          <p:nvPr>
+            <p:ph type="body" idx="1"/>
+          </p:nvPr>
+        </p:nvSpPr>
+        <p:spPr>
+          <a:xfrm>
+            <a:off x="838200" y="1825625"/>
+            <a:ext cx="10515600" cy="2618556"/>
+          </a:xfrm>
+        </p:spPr>
+        <p:txBody>
+          <a:bodyPr>
+            <a:normAutofit fontScale="85000" lnSpcReduction="10000"/>
+          </a:bodyPr>
+          <a:lstStyle/>
+          <a:p>
+            <a:r>
+              <a:rPr lang="en-US" dirty="0"/>
+              <a:t>A stack is a linear data structure that follows the </a:t>
+            </a:r>
+            <a:r>
+              <a:rPr lang="en-US" b="1" dirty="0"/>
+              <a:t>Last-In-First-Out (LIFO) </a:t>
+            </a:r>
+            <a:r>
+              <a:rPr lang="en-US" dirty="0"/>
+              <a:t>principle. It behaves like a stack of plates, where the last plate added is the first one to be removed.</a:t>
+            </a:r>
+            <a:endParaRPr lang="en-US" dirty="0" smtClean="0"/>
+          </a:p>
+          <a:p>
+            <a:r>
+              <a:rPr lang="en-US" dirty="0" smtClean="0"/>
+              <a:t>A stack </a:t>
+            </a:r>
+            <a:r>
+              <a:rPr lang="en-US" dirty="0"/>
+              <a:t>is an ADT that comprises two </a:t>
+            </a:r>
+            <a:r>
+              <a:rPr lang="en-US" dirty="0" smtClean="0"/>
+              <a:t>basic operations</a:t>
+            </a:r>
+            <a:r>
+              <a:rPr lang="en-US" dirty="0"/>
+              <a:t>: insert (push) a new item, and remove (pop) the item that </a:t>
+            </a:r>
+            <a:r>
+              <a:rPr lang="en-US" dirty="0" smtClean="0"/>
+              <a:t>was most </a:t>
+            </a:r>
+            <a:r>
+              <a:rPr lang="en-US" dirty="0"/>
+              <a:t>recently inserted</a:t>
+            </a:r>
+            <a:r>
+              <a:rPr lang="en-US" dirty="0" smtClean="0"/>
+              <a:t>.</a:t>
+            </a:r>
+          </a:p>
+          <a:p>
+            <a:r>
+              <a:rPr lang="en-US" dirty="0"/>
+              <a:t>Stack. Examine the item most recently added</a:t>
+            </a:r>
+            <a:r>
+              <a:rPr lang="en-US" dirty="0" smtClean="0"/>
+              <a:t>.</a:t>
+            </a:r>
+          </a:p>
+          <a:p>
+            <a:pPr lvl="1"/>
+            <a:r>
+              <a:rPr lang="en-US" dirty="0"/>
+              <a:t>LIFO = "last in first out"</a:t>
+            </a:r>
+          </a:p>
+        </p:txBody>
+      </p:sp>
+      <p:pic>
+        <p:nvPicPr>
+          <p:cNvPr id="4" name="Picture 3"/>
+          <p:cNvPicPr>
+            <a:picLocks noChangeAspect="1"/>
+          </p:cNvPicPr>
+          <p:nvPr/>
+        </p:nvPicPr>
+        <p:blipFill>
+          <a:blip r:embed="rId2"/>
+          <a:stretch>
+            <a:fillRect/>
+          </a:stretch>
+        </p:blipFill>
+        <p:spPr>
+          <a:xfrm>
+            <a:off x="3022403" y="4983329"/>
+            <a:ext cx="5753903" cy="1276528"/>
+          </a:xfrm>
+          <a:prstGeom prst="rect">
+            <a:avLst/>
+          </a:prstGeom>
+        </p:spPr>
+      </p:pic>
+    </p:spTree>
+    <p:extLst>
+      <p:ext uri="{BB962C8B-B14F-4D97-AF65-F5344CB8AC3E}">
+        <p14:creationId xmlns:p14="http://schemas.microsoft.com/office/powerpoint/2010/main" val="1758649139"/>
+      </p:ext>
+    </p:extLst>
+  </p:cSld>
+  <p:clrMapOvr>
+    <a:masterClrMapping/>
+  </p:clrMapOvr>
+  <p:timing>
+    <p:tnLst>
+      <p:par>
+        <p:cTn id="1" dur="indefinite" restart="never" nodeType="tmRoot"/>
+      </p:par>
+    </p:tnLst>
+  </p:timing>
+</p:sld>
+</file>
+
+<file path=ppt/slides/slide20.xml><?xml version="1.0" encoding="utf-8"?>
+<p:sld xmlns:a="http://schemas.openxmlformats.org/drawingml/2006/main" xmlns:r="http://schemas.openxmlformats.org/officeDocument/2006/relationships" xmlns:p="http://schemas.openxmlformats.org/presentationml/2006/main">
+  <p:cSld>
+    <p:spTree>
+      <p:nvGrpSpPr>
+        <p:cNvPr id="1" name=""/>
+        <p:cNvGrpSpPr/>
+        <p:nvPr/>
+      </p:nvGrpSpPr>
+      <p:grpSpPr>
+        <a:xfrm>
+          <a:off x="0" y="0"/>
+          <a:ext cx="0" cy="0"/>
+          <a:chOff x="0" y="0"/>
+          <a:chExt cx="0" cy="0"/>
+        </a:xfrm>
+      </p:grpSpPr>
+      <p:sp>
+        <p:nvSpPr>
+          <p:cNvPr id="2" name="Title 1"/>
+          <p:cNvSpPr>
+            <a:spLocks noGrp="1"/>
+          </p:cNvSpPr>
+          <p:nvPr>
+            <p:ph type="title"/>
+          </p:nvPr>
+        </p:nvSpPr>
+        <p:spPr/>
+        <p:txBody>
+          <a:bodyPr/>
+          <a:lstStyle/>
+          <a:p>
+            <a:r>
+              <a:rPr lang="en-US" dirty="0" smtClean="0"/>
+              <a:t>Answer!</a:t>
+            </a:r>
+            <a:endParaRPr lang="en-US" dirty="0"/>
+          </a:p>
+        </p:txBody>
+      </p:sp>
+      <p:sp>
+        <p:nvSpPr>
+          <p:cNvPr id="3" name="Text Placeholder 2"/>
+          <p:cNvSpPr>
+            <a:spLocks noGrp="1"/>
+          </p:cNvSpPr>
+          <p:nvPr>
+            <p:ph type="body" idx="1"/>
+          </p:nvPr>
+        </p:nvSpPr>
+        <p:spPr/>
+        <p:txBody>
+          <a:bodyPr/>
+          <a:lstStyle/>
+          <a:p>
+            <a:r>
+              <a:rPr lang="en-US" dirty="0"/>
+              <a:t>The stack will contain a single value: '(', The procedure will push the initial '(', and then pop it off to match the ')'. It'll then push the next '(', and the '[', and then pop off the '[' to match the ']'. What remains will the </a:t>
+            </a:r>
+            <a:r>
+              <a:rPr lang="en-US" dirty="0" err="1"/>
+              <a:t>the</a:t>
+            </a:r>
+            <a:r>
+              <a:rPr lang="en-US" dirty="0"/>
+              <a:t> '('.</a:t>
+            </a:r>
+          </a:p>
+        </p:txBody>
+      </p:sp>
+    </p:spTree>
+    <p:extLst>
+      <p:ext uri="{BB962C8B-B14F-4D97-AF65-F5344CB8AC3E}">
+        <p14:creationId xmlns:p14="http://schemas.microsoft.com/office/powerpoint/2010/main" val="2324927297"/>
+      </p:ext>
+    </p:extLst>
+  </p:cSld>
+  <p:clrMapOvr>
+    <a:masterClrMapping/>
+  </p:clrMapOvr>
+</p:sld>
+</file>
+
+<file path=ppt/slides/slide21.xml><?xml version="1.0" encoding="utf-8"?>
+<p:sld xmlns:a="http://schemas.openxmlformats.org/drawingml/2006/main" xmlns:r="http://schemas.openxmlformats.org/officeDocument/2006/relationships" xmlns:p="http://schemas.openxmlformats.org/presentationml/2006/main">
+  <p:cSld>
+    <p:spTree>
+      <p:nvGrpSpPr>
+        <p:cNvPr id="1" name=""/>
+        <p:cNvGrpSpPr/>
+        <p:nvPr/>
+      </p:nvGrpSpPr>
+      <p:grpSpPr>
+        <a:xfrm>
+          <a:off x="0" y="0"/>
+          <a:ext cx="0" cy="0"/>
+          <a:chOff x="0" y="0"/>
+          <a:chExt cx="0" cy="0"/>
+        </a:xfrm>
+      </p:grpSpPr>
+      <p:sp>
+        <p:nvSpPr>
+          <p:cNvPr id="2" name="Title 1"/>
+          <p:cNvSpPr>
+            <a:spLocks noGrp="1"/>
+          </p:cNvSpPr>
+          <p:nvPr>
+            <p:ph type="title"/>
+          </p:nvPr>
+        </p:nvSpPr>
+        <p:spPr/>
+        <p:txBody>
+          <a:bodyPr/>
+          <a:lstStyle/>
+          <a:p>
+            <a:endParaRPr lang="en-US" dirty="0"/>
+          </a:p>
+        </p:txBody>
+      </p:sp>
+      <p:sp>
+        <p:nvSpPr>
+          <p:cNvPr id="3" name="Text Placeholder 2"/>
+          <p:cNvSpPr>
+            <a:spLocks noGrp="1"/>
+          </p:cNvSpPr>
+          <p:nvPr>
+            <p:ph type="body" idx="1"/>
+          </p:nvPr>
+        </p:nvSpPr>
+        <p:spPr/>
+        <p:txBody>
+          <a:bodyPr/>
+          <a:lstStyle/>
+          <a:p>
             <a:r>
               <a:rPr lang="en-US" dirty="0" smtClean="0"/>
               <a:t>We will continue this stack topic </a:t>
@@ -14693,7 +15300,614 @@
 </p:sld>
 </file>
 
-<file path=ppt/slides/slide19.xml><?xml version="1.0" encoding="utf-8"?>
+<file path=ppt/slides/slide22.xml><?xml version="1.0" encoding="utf-8"?>
+<p:sld xmlns:a="http://schemas.openxmlformats.org/drawingml/2006/main" xmlns:r="http://schemas.openxmlformats.org/officeDocument/2006/relationships" xmlns:p="http://schemas.openxmlformats.org/presentationml/2006/main">
+  <p:cSld>
+    <p:spTree>
+      <p:nvGrpSpPr>
+        <p:cNvPr id="1" name=""/>
+        <p:cNvGrpSpPr/>
+        <p:nvPr/>
+      </p:nvGrpSpPr>
+      <p:grpSpPr>
+        <a:xfrm>
+          <a:off x="0" y="0"/>
+          <a:ext cx="0" cy="0"/>
+          <a:chOff x="0" y="0"/>
+          <a:chExt cx="0" cy="0"/>
+        </a:xfrm>
+      </p:grpSpPr>
+      <p:sp>
+        <p:nvSpPr>
+          <p:cNvPr id="2" name="Title 1"/>
+          <p:cNvSpPr>
+            <a:spLocks noGrp="1"/>
+          </p:cNvSpPr>
+          <p:nvPr>
+            <p:ph type="title"/>
+          </p:nvPr>
+        </p:nvSpPr>
+        <p:spPr/>
+        <p:txBody>
+          <a:bodyPr/>
+          <a:lstStyle/>
+          <a:p>
+            <a:r>
+              <a:rPr lang="en-US" dirty="0"/>
+              <a:t>Expression Evaluation</a:t>
+            </a:r>
+          </a:p>
+        </p:txBody>
+      </p:sp>
+      <p:sp>
+        <p:nvSpPr>
+          <p:cNvPr id="3" name="Text Placeholder 2"/>
+          <p:cNvSpPr>
+            <a:spLocks noGrp="1"/>
+          </p:cNvSpPr>
+          <p:nvPr>
+            <p:ph type="body" idx="1"/>
+          </p:nvPr>
+        </p:nvSpPr>
+        <p:spPr/>
+        <p:txBody>
+          <a:bodyPr/>
+          <a:lstStyle/>
+          <a:p>
+            <a:r>
+              <a:rPr lang="en-US" b="1" dirty="0"/>
+              <a:t>Infix Notation: </a:t>
+            </a:r>
+            <a:r>
+              <a:rPr lang="en-US" dirty="0"/>
+              <a:t>Operators are written between the operands they operate on, e.g. 3 + 4.</a:t>
+            </a:r>
+          </a:p>
+          <a:p>
+            <a:r>
+              <a:rPr lang="en-US" b="1" dirty="0"/>
+              <a:t>Prefix Notation: </a:t>
+            </a:r>
+            <a:r>
+              <a:rPr lang="en-US" dirty="0"/>
+              <a:t>Operators are written before the operands, </a:t>
+            </a:r>
+            <a:r>
+              <a:rPr lang="en-US" dirty="0" err="1"/>
+              <a:t>e.g</a:t>
+            </a:r>
+            <a:r>
+              <a:rPr lang="en-US" dirty="0"/>
+              <a:t> + 3 4</a:t>
+            </a:r>
+          </a:p>
+          <a:p>
+            <a:r>
+              <a:rPr lang="en-US" b="1" dirty="0"/>
+              <a:t>Postfix Notation: </a:t>
+            </a:r>
+            <a:r>
+              <a:rPr lang="en-US" dirty="0"/>
+              <a:t>Operators are written after operands.</a:t>
+            </a:r>
+          </a:p>
+        </p:txBody>
+      </p:sp>
+      <p:pic>
+        <p:nvPicPr>
+          <p:cNvPr id="5" name="Picture 4"/>
+          <p:cNvPicPr>
+            <a:picLocks noChangeAspect="1"/>
+          </p:cNvPicPr>
+          <p:nvPr/>
+        </p:nvPicPr>
+        <p:blipFill>
+          <a:blip r:embed="rId2"/>
+          <a:stretch>
+            <a:fillRect/>
+          </a:stretch>
+        </p:blipFill>
+        <p:spPr>
+          <a:xfrm>
+            <a:off x="3584011" y="4803058"/>
+            <a:ext cx="4276725" cy="1066800"/>
+          </a:xfrm>
+          <a:prstGeom prst="rect">
+            <a:avLst/>
+          </a:prstGeom>
+        </p:spPr>
+      </p:pic>
+    </p:spTree>
+    <p:extLst>
+      <p:ext uri="{BB962C8B-B14F-4D97-AF65-F5344CB8AC3E}">
+        <p14:creationId xmlns:p14="http://schemas.microsoft.com/office/powerpoint/2010/main" val="3539947107"/>
+      </p:ext>
+    </p:extLst>
+  </p:cSld>
+  <p:clrMapOvr>
+    <a:masterClrMapping/>
+  </p:clrMapOvr>
+</p:sld>
+</file>
+
+<file path=ppt/slides/slide23.xml><?xml version="1.0" encoding="utf-8"?>
+<p:sld xmlns:a="http://schemas.openxmlformats.org/drawingml/2006/main" xmlns:r="http://schemas.openxmlformats.org/officeDocument/2006/relationships" xmlns:p="http://schemas.openxmlformats.org/presentationml/2006/main">
+  <p:cSld>
+    <p:spTree>
+      <p:nvGrpSpPr>
+        <p:cNvPr id="1" name=""/>
+        <p:cNvGrpSpPr/>
+        <p:nvPr/>
+      </p:nvGrpSpPr>
+      <p:grpSpPr>
+        <a:xfrm>
+          <a:off x="0" y="0"/>
+          <a:ext cx="0" cy="0"/>
+          <a:chOff x="0" y="0"/>
+          <a:chExt cx="0" cy="0"/>
+        </a:xfrm>
+      </p:grpSpPr>
+      <p:sp>
+        <p:nvSpPr>
+          <p:cNvPr id="2" name="Title 1"/>
+          <p:cNvSpPr>
+            <a:spLocks noGrp="1"/>
+          </p:cNvSpPr>
+          <p:nvPr>
+            <p:ph type="title"/>
+          </p:nvPr>
+        </p:nvSpPr>
+        <p:spPr>
+          <a:xfrm>
+            <a:off x="838200" y="365126"/>
+            <a:ext cx="4441723" cy="1119546"/>
+          </a:xfrm>
+        </p:spPr>
+        <p:txBody>
+          <a:bodyPr>
+            <a:normAutofit fontScale="90000"/>
+          </a:bodyPr>
+          <a:lstStyle/>
+          <a:p>
+            <a:r>
+              <a:rPr lang="en-US" dirty="0"/>
+              <a:t>Convert Infix expression to Postfix expression</a:t>
+            </a:r>
+          </a:p>
+        </p:txBody>
+      </p:sp>
+      <p:sp>
+        <p:nvSpPr>
+          <p:cNvPr id="3" name="Text Placeholder 2"/>
+          <p:cNvSpPr>
+            <a:spLocks noGrp="1"/>
+          </p:cNvSpPr>
+          <p:nvPr>
+            <p:ph type="body" idx="1"/>
+          </p:nvPr>
+        </p:nvSpPr>
+        <p:spPr>
+          <a:xfrm>
+            <a:off x="5751872" y="114811"/>
+            <a:ext cx="6066504" cy="6462969"/>
+          </a:xfrm>
+        </p:spPr>
+        <p:txBody>
+          <a:bodyPr>
+            <a:normAutofit fontScale="92500" lnSpcReduction="20000"/>
+          </a:bodyPr>
+          <a:lstStyle/>
+          <a:p>
+            <a:pPr marL="628650" indent="-514350">
+              <a:buFont typeface="+mj-lt"/>
+              <a:buAutoNum type="arabicPeriod"/>
+            </a:pPr>
+            <a:r>
+              <a:rPr lang="en-US" dirty="0"/>
+              <a:t>Create an empty stack S and an empty list output.</a:t>
+            </a:r>
+          </a:p>
+          <a:p>
+            <a:pPr marL="628650" indent="-514350">
+              <a:buFont typeface="+mj-lt"/>
+              <a:buAutoNum type="arabicPeriod"/>
+            </a:pPr>
+            <a:r>
+              <a:rPr lang="en-US" dirty="0"/>
+              <a:t>Iterate through each character </a:t>
+            </a:r>
+            <a:r>
+              <a:rPr lang="en-US" dirty="0" err="1"/>
+              <a:t>ch</a:t>
+            </a:r>
+            <a:r>
+              <a:rPr lang="en-US" dirty="0"/>
+              <a:t> in the infix expression:</a:t>
+            </a:r>
+          </a:p>
+          <a:p>
+            <a:pPr marL="1028700" lvl="1" indent="-457200">
+              <a:buFont typeface="+mj-lt"/>
+              <a:buAutoNum type="arabicPeriod"/>
+            </a:pPr>
+            <a:r>
+              <a:rPr lang="en-US" dirty="0"/>
+              <a:t>Operand: If </a:t>
+            </a:r>
+            <a:r>
+              <a:rPr lang="en-US" dirty="0" err="1"/>
+              <a:t>ch</a:t>
+            </a:r>
+            <a:r>
+              <a:rPr lang="en-US" dirty="0"/>
+              <a:t> is an operand (number/variable), append it to output.</a:t>
+            </a:r>
+          </a:p>
+          <a:p>
+            <a:pPr marL="1028700" lvl="1" indent="-457200">
+              <a:buFont typeface="+mj-lt"/>
+              <a:buAutoNum type="arabicPeriod"/>
+            </a:pPr>
+            <a:r>
+              <a:rPr lang="en-US" dirty="0"/>
+              <a:t>Left Parenthesis (: Push it onto the stack.</a:t>
+            </a:r>
+          </a:p>
+          <a:p>
+            <a:pPr marL="1028700" lvl="1" indent="-457200">
+              <a:buFont typeface="+mj-lt"/>
+              <a:buAutoNum type="arabicPeriod"/>
+            </a:pPr>
+            <a:r>
+              <a:rPr lang="en-US" dirty="0"/>
+              <a:t>Right Parenthesis ):Pop from the stack to output until encountering a left parenthesis (.Discard the left parenthesis</a:t>
+            </a:r>
+            <a:r>
+              <a:rPr lang="en-US" dirty="0" smtClean="0"/>
+              <a:t>.</a:t>
+            </a:r>
+          </a:p>
+          <a:p>
+            <a:pPr marL="1028700" lvl="1" indent="-457200">
+              <a:buFont typeface="+mj-lt"/>
+              <a:buAutoNum type="arabicPeriod"/>
+            </a:pPr>
+            <a:r>
+              <a:rPr lang="en-US" dirty="0" smtClean="0"/>
+              <a:t>Operator </a:t>
+            </a:r>
+            <a:r>
+              <a:rPr lang="en-US" dirty="0"/>
+              <a:t>(+, -, *, /, </a:t>
+            </a:r>
+            <a:r>
+              <a:rPr lang="en-US" dirty="0" smtClean="0"/>
+              <a:t>^):</a:t>
+            </a:r>
+          </a:p>
+          <a:p>
+            <a:pPr lvl="2"/>
+            <a:r>
+              <a:rPr lang="en-US" dirty="0" smtClean="0"/>
+              <a:t>While there is an operator on the stack with higher or equal precedence than </a:t>
+            </a:r>
+            <a:r>
+              <a:rPr lang="en-US" dirty="0" err="1" smtClean="0"/>
+              <a:t>ch</a:t>
+            </a:r>
+            <a:r>
+              <a:rPr lang="en-US" dirty="0" smtClean="0"/>
+              <a:t>:</a:t>
+            </a:r>
+          </a:p>
+          <a:p>
+            <a:pPr lvl="3"/>
+            <a:r>
+              <a:rPr lang="en-US" dirty="0" smtClean="0"/>
+              <a:t>Pop from the stack to output.</a:t>
+            </a:r>
+          </a:p>
+          <a:p>
+            <a:pPr lvl="2"/>
+            <a:r>
+              <a:rPr lang="en-US" dirty="0" smtClean="0"/>
+              <a:t>Push </a:t>
+            </a:r>
+            <a:r>
+              <a:rPr lang="en-US" dirty="0" err="1" smtClean="0"/>
+              <a:t>ch</a:t>
+            </a:r>
+            <a:r>
+              <a:rPr lang="en-US" dirty="0" smtClean="0"/>
+              <a:t> onto the stack.</a:t>
+            </a:r>
+          </a:p>
+          <a:p>
+            <a:pPr marL="571500" indent="-457200">
+              <a:buFont typeface="+mj-lt"/>
+              <a:buAutoNum type="arabicPeriod"/>
+            </a:pPr>
+            <a:r>
+              <a:rPr lang="en-US" dirty="0" smtClean="0"/>
+              <a:t>After the loop, pop all operators from the stack to output.</a:t>
+            </a:r>
+          </a:p>
+          <a:p>
+            <a:pPr marL="571500" indent="-457200">
+              <a:buFont typeface="+mj-lt"/>
+              <a:buAutoNum type="arabicPeriod"/>
+            </a:pPr>
+            <a:r>
+              <a:rPr lang="en-US" dirty="0" smtClean="0"/>
+              <a:t>Return </a:t>
+            </a:r>
+            <a:r>
+              <a:rPr lang="en-US" dirty="0"/>
+              <a:t>the joined output list as the postfix expression</a:t>
+            </a:r>
+          </a:p>
+        </p:txBody>
+      </p:sp>
+      <p:pic>
+        <p:nvPicPr>
+          <p:cNvPr id="2050" name="Picture 2" descr="Infix to Postfix Using Stack | Data Structure - Online Free Education in  India - vrakshacademy"/>
+          <p:cNvPicPr>
+            <a:picLocks noChangeAspect="1" noChangeArrowheads="1"/>
+          </p:cNvPicPr>
+          <p:nvPr/>
+        </p:nvPicPr>
+        <p:blipFill>
+          <a:blip r:embed="rId2">
+            <a:extLst>
+              <a:ext uri="{28A0092B-C50C-407E-A947-70E740481C1C}">
+                <a14:useLocalDpi xmlns:a14="http://schemas.microsoft.com/office/drawing/2010/main" val="0"/>
+              </a:ext>
+            </a:extLst>
+          </a:blip>
+          <a:srcRect/>
+          <a:stretch>
+            <a:fillRect/>
+          </a:stretch>
+        </p:blipFill>
+        <p:spPr bwMode="auto">
+          <a:xfrm>
+            <a:off x="942156" y="2233255"/>
+            <a:ext cx="3810000" cy="3248026"/>
+          </a:xfrm>
+          <a:prstGeom prst="rect">
+            <a:avLst/>
+          </a:prstGeom>
+          <a:noFill/>
+          <a:extLst>
+            <a:ext uri="{909E8E84-426E-40DD-AFC4-6F175D3DCCD1}">
+              <a14:hiddenFill xmlns:a14="http://schemas.microsoft.com/office/drawing/2010/main">
+                <a:solidFill>
+                  <a:srgbClr val="FFFFFF"/>
+                </a:solidFill>
+              </a14:hiddenFill>
+            </a:ext>
+          </a:extLst>
+        </p:spPr>
+      </p:pic>
+    </p:spTree>
+    <p:extLst>
+      <p:ext uri="{BB962C8B-B14F-4D97-AF65-F5344CB8AC3E}">
+        <p14:creationId xmlns:p14="http://schemas.microsoft.com/office/powerpoint/2010/main" val="3355287082"/>
+      </p:ext>
+    </p:extLst>
+  </p:cSld>
+  <p:clrMapOvr>
+    <a:masterClrMapping/>
+  </p:clrMapOvr>
+</p:sld>
+</file>
+
+<file path=ppt/slides/slide24.xml><?xml version="1.0" encoding="utf-8"?>
+<p:sld xmlns:a="http://schemas.openxmlformats.org/drawingml/2006/main" xmlns:r="http://schemas.openxmlformats.org/officeDocument/2006/relationships" xmlns:p="http://schemas.openxmlformats.org/presentationml/2006/main">
+  <p:cSld>
+    <p:spTree>
+      <p:nvGrpSpPr>
+        <p:cNvPr id="1" name=""/>
+        <p:cNvGrpSpPr/>
+        <p:nvPr/>
+      </p:nvGrpSpPr>
+      <p:grpSpPr>
+        <a:xfrm>
+          <a:off x="0" y="0"/>
+          <a:ext cx="0" cy="0"/>
+          <a:chOff x="0" y="0"/>
+          <a:chExt cx="0" cy="0"/>
+        </a:xfrm>
+      </p:grpSpPr>
+      <p:sp>
+        <p:nvSpPr>
+          <p:cNvPr id="2" name="Title 1"/>
+          <p:cNvSpPr>
+            <a:spLocks noGrp="1"/>
+          </p:cNvSpPr>
+          <p:nvPr>
+            <p:ph type="title"/>
+          </p:nvPr>
+        </p:nvSpPr>
+        <p:spPr/>
+        <p:txBody>
+          <a:bodyPr/>
+          <a:lstStyle/>
+          <a:p>
+            <a:endParaRPr lang="en-US"/>
+          </a:p>
+        </p:txBody>
+      </p:sp>
+      <p:sp>
+        <p:nvSpPr>
+          <p:cNvPr id="3" name="Text Placeholder 2"/>
+          <p:cNvSpPr>
+            <a:spLocks noGrp="1"/>
+          </p:cNvSpPr>
+          <p:nvPr>
+            <p:ph type="body" idx="1"/>
+          </p:nvPr>
+        </p:nvSpPr>
+        <p:spPr/>
+        <p:txBody>
+          <a:bodyPr/>
+          <a:lstStyle/>
+          <a:p>
+            <a:endParaRPr lang="en-US"/>
+          </a:p>
+        </p:txBody>
+      </p:sp>
+      <p:pic>
+        <p:nvPicPr>
+          <p:cNvPr id="4" name="Picture 3"/>
+          <p:cNvPicPr>
+            <a:picLocks noChangeAspect="1"/>
+          </p:cNvPicPr>
+          <p:nvPr/>
+        </p:nvPicPr>
+        <p:blipFill>
+          <a:blip r:embed="rId2"/>
+          <a:stretch>
+            <a:fillRect/>
+          </a:stretch>
+        </p:blipFill>
+        <p:spPr>
+          <a:xfrm>
+            <a:off x="2347389" y="1204602"/>
+            <a:ext cx="7497221" cy="4448796"/>
+          </a:xfrm>
+          <a:prstGeom prst="rect">
+            <a:avLst/>
+          </a:prstGeom>
+        </p:spPr>
+      </p:pic>
+    </p:spTree>
+    <p:extLst>
+      <p:ext uri="{BB962C8B-B14F-4D97-AF65-F5344CB8AC3E}">
+        <p14:creationId xmlns:p14="http://schemas.microsoft.com/office/powerpoint/2010/main" val="3499754799"/>
+      </p:ext>
+    </p:extLst>
+  </p:cSld>
+  <p:clrMapOvr>
+    <a:masterClrMapping/>
+  </p:clrMapOvr>
+</p:sld>
+</file>
+
+<file path=ppt/slides/slide25.xml><?xml version="1.0" encoding="utf-8"?>
+<p:sld xmlns:a="http://schemas.openxmlformats.org/drawingml/2006/main" xmlns:r="http://schemas.openxmlformats.org/officeDocument/2006/relationships" xmlns:p="http://schemas.openxmlformats.org/presentationml/2006/main">
+  <p:cSld>
+    <p:spTree>
+      <p:nvGrpSpPr>
+        <p:cNvPr id="1" name=""/>
+        <p:cNvGrpSpPr/>
+        <p:nvPr/>
+      </p:nvGrpSpPr>
+      <p:grpSpPr>
+        <a:xfrm>
+          <a:off x="0" y="0"/>
+          <a:ext cx="0" cy="0"/>
+          <a:chOff x="0" y="0"/>
+          <a:chExt cx="0" cy="0"/>
+        </a:xfrm>
+      </p:grpSpPr>
+      <p:sp>
+        <p:nvSpPr>
+          <p:cNvPr id="2" name="Title 1"/>
+          <p:cNvSpPr>
+            <a:spLocks noGrp="1"/>
+          </p:cNvSpPr>
+          <p:nvPr>
+            <p:ph type="title"/>
+          </p:nvPr>
+        </p:nvSpPr>
+        <p:spPr/>
+        <p:txBody>
+          <a:bodyPr/>
+          <a:lstStyle/>
+          <a:p>
+            <a:r>
+              <a:rPr lang="en-US" dirty="0" smtClean="0"/>
+              <a:t>Undo and Redo </a:t>
+            </a:r>
+            <a:endParaRPr lang="en-US" dirty="0"/>
+          </a:p>
+        </p:txBody>
+      </p:sp>
+      <p:sp>
+        <p:nvSpPr>
+          <p:cNvPr id="3" name="Text Placeholder 2"/>
+          <p:cNvSpPr>
+            <a:spLocks noGrp="1"/>
+          </p:cNvSpPr>
+          <p:nvPr>
+            <p:ph type="body" idx="1"/>
+          </p:nvPr>
+        </p:nvSpPr>
+        <p:spPr/>
+        <p:txBody>
+          <a:bodyPr/>
+          <a:lstStyle/>
+          <a:p>
+            <a:endParaRPr lang="en-US"/>
+          </a:p>
+        </p:txBody>
+      </p:sp>
+      <p:pic>
+        <p:nvPicPr>
+          <p:cNvPr id="3074" name="Picture 2" descr="https://unity-connect-prd.storage.googleapis.com/20240301/learn/images/b651c92b-96b4-4a68-ba35-02f32753fbf0_Copy_of_6-4_UndoRedoStacks.png"/>
+          <p:cNvPicPr>
+            <a:picLocks noChangeAspect="1" noChangeArrowheads="1"/>
+          </p:cNvPicPr>
+          <p:nvPr/>
+        </p:nvPicPr>
+        <p:blipFill>
+          <a:blip r:embed="rId2">
+            <a:extLst>
+              <a:ext uri="{28A0092B-C50C-407E-A947-70E740481C1C}">
+                <a14:useLocalDpi xmlns:a14="http://schemas.microsoft.com/office/drawing/2010/main" val="0"/>
+              </a:ext>
+            </a:extLst>
+          </a:blip>
+          <a:srcRect/>
+          <a:stretch>
+            <a:fillRect/>
+          </a:stretch>
+        </p:blipFill>
+        <p:spPr bwMode="auto">
+          <a:xfrm>
+            <a:off x="2431651" y="1757561"/>
+            <a:ext cx="6026549" cy="4487466"/>
+          </a:xfrm>
+          <a:prstGeom prst="rect">
+            <a:avLst/>
+          </a:prstGeom>
+          <a:noFill/>
+          <a:extLst>
+            <a:ext uri="{909E8E84-426E-40DD-AFC4-6F175D3DCCD1}">
+              <a14:hiddenFill xmlns:a14="http://schemas.microsoft.com/office/drawing/2010/main">
+                <a:solidFill>
+                  <a:srgbClr val="FFFFFF"/>
+                </a:solidFill>
+              </a14:hiddenFill>
+            </a:ext>
+          </a:extLst>
+        </p:spPr>
+      </p:pic>
+    </p:spTree>
+    <p:extLst>
+      <p:ext uri="{BB962C8B-B14F-4D97-AF65-F5344CB8AC3E}">
+        <p14:creationId xmlns:p14="http://schemas.microsoft.com/office/powerpoint/2010/main" val="831558397"/>
+      </p:ext>
+    </p:extLst>
+  </p:cSld>
+  <p:clrMapOvr>
+    <a:masterClrMapping/>
+  </p:clrMapOvr>
+</p:sld>
+</file>
+
+<file path=ppt/slides/slide26.xml><?xml version="1.0" encoding="utf-8"?>
 <p:sld xmlns:a="http://schemas.openxmlformats.org/drawingml/2006/main" xmlns:r="http://schemas.openxmlformats.org/officeDocument/2006/relationships" xmlns:p="http://schemas.openxmlformats.org/presentationml/2006/main">
   <p:cSld>
     <p:spTree>
@@ -14838,169 +16052,7 @@
 </p:sld>
 </file>
 
-<file path=ppt/slides/slide2.xml><?xml version="1.0" encoding="utf-8"?>
-<p:sld xmlns:a="http://schemas.openxmlformats.org/drawingml/2006/main" xmlns:r="http://schemas.openxmlformats.org/officeDocument/2006/relationships" xmlns:p="http://schemas.openxmlformats.org/presentationml/2006/main">
-  <p:cSld>
-    <p:spTree>
-      <p:nvGrpSpPr>
-        <p:cNvPr id="1" name=""/>
-        <p:cNvGrpSpPr/>
-        <p:nvPr/>
-      </p:nvGrpSpPr>
-      <p:grpSpPr>
-        <a:xfrm>
-          <a:off x="0" y="0"/>
-          <a:ext cx="0" cy="0"/>
-          <a:chOff x="0" y="0"/>
-          <a:chExt cx="0" cy="0"/>
-        </a:xfrm>
-      </p:grpSpPr>
-      <p:sp>
-        <p:nvSpPr>
-          <p:cNvPr id="2" name="Title 1"/>
-          <p:cNvSpPr>
-            <a:spLocks noGrp="1"/>
-          </p:cNvSpPr>
-          <p:nvPr>
-            <p:ph type="title"/>
-          </p:nvPr>
-        </p:nvSpPr>
-        <p:spPr/>
-        <p:txBody>
-          <a:bodyPr/>
-          <a:lstStyle/>
-          <a:p>
-            <a:r>
-              <a:rPr lang="en-US" dirty="0" smtClean="0"/>
-              <a:t>Stack</a:t>
-            </a:r>
-            <a:endParaRPr lang="en-US" dirty="0"/>
-          </a:p>
-        </p:txBody>
-      </p:sp>
-      <p:sp>
-        <p:nvSpPr>
-          <p:cNvPr id="3" name="Text Placeholder 2"/>
-          <p:cNvSpPr>
-            <a:spLocks noGrp="1"/>
-          </p:cNvSpPr>
-          <p:nvPr>
-            <p:ph type="body" idx="1"/>
-          </p:nvPr>
-        </p:nvSpPr>
-        <p:spPr>
-          <a:xfrm>
-            <a:off x="838200" y="1825625"/>
-            <a:ext cx="10515600" cy="2618556"/>
-          </a:xfrm>
-        </p:spPr>
-        <p:txBody>
-          <a:bodyPr>
-            <a:normAutofit fontScale="85000" lnSpcReduction="10000"/>
-          </a:bodyPr>
-          <a:lstStyle/>
-          <a:p>
-            <a:r>
-              <a:rPr lang="en-US" dirty="0"/>
-              <a:t>A stack is a linear data structure that follows the </a:t>
-            </a:r>
-            <a:r>
-              <a:rPr lang="en-US" b="1" dirty="0"/>
-              <a:t>Last-In-First-Out (LIFO) </a:t>
-            </a:r>
-            <a:r>
-              <a:rPr lang="en-US" dirty="0"/>
-              <a:t>principle. It behaves like a stack of plates, where the last plate added is the first one to be removed.</a:t>
-            </a:r>
-            <a:endParaRPr lang="en-US" dirty="0" smtClean="0"/>
-          </a:p>
-          <a:p>
-            <a:r>
-              <a:rPr lang="en-US" dirty="0" smtClean="0"/>
-              <a:t>A stack </a:t>
-            </a:r>
-            <a:r>
-              <a:rPr lang="en-US" dirty="0"/>
-              <a:t>is an ADT that comprises two </a:t>
-            </a:r>
-            <a:r>
-              <a:rPr lang="en-US" dirty="0" smtClean="0"/>
-              <a:t>basic operations</a:t>
-            </a:r>
-            <a:r>
-              <a:rPr lang="en-US" dirty="0"/>
-              <a:t>: insert (push) a new item, and remove (pop) the item that </a:t>
-            </a:r>
-            <a:r>
-              <a:rPr lang="en-US" dirty="0" smtClean="0"/>
-              <a:t>was most </a:t>
-            </a:r>
-            <a:r>
-              <a:rPr lang="en-US" dirty="0"/>
-              <a:t>recently inserted</a:t>
-            </a:r>
-            <a:r>
-              <a:rPr lang="en-US" dirty="0" smtClean="0"/>
-              <a:t>.</a:t>
-            </a:r>
-          </a:p>
-          <a:p>
-            <a:r>
-              <a:rPr lang="en-US" dirty="0"/>
-              <a:t>Stack. Examine the item most recently added</a:t>
-            </a:r>
-            <a:r>
-              <a:rPr lang="en-US" dirty="0" smtClean="0"/>
-              <a:t>.</a:t>
-            </a:r>
-          </a:p>
-          <a:p>
-            <a:pPr lvl="1"/>
-            <a:r>
-              <a:rPr lang="en-US" dirty="0"/>
-              <a:t>LIFO = "last in first out"</a:t>
-            </a:r>
-          </a:p>
-        </p:txBody>
-      </p:sp>
-      <p:pic>
-        <p:nvPicPr>
-          <p:cNvPr id="4" name="Picture 3"/>
-          <p:cNvPicPr>
-            <a:picLocks noChangeAspect="1"/>
-          </p:cNvPicPr>
-          <p:nvPr/>
-        </p:nvPicPr>
-        <p:blipFill>
-          <a:blip r:embed="rId2"/>
-          <a:stretch>
-            <a:fillRect/>
-          </a:stretch>
-        </p:blipFill>
-        <p:spPr>
-          <a:xfrm>
-            <a:off x="3022403" y="4983329"/>
-            <a:ext cx="5753903" cy="1276528"/>
-          </a:xfrm>
-          <a:prstGeom prst="rect">
-            <a:avLst/>
-          </a:prstGeom>
-        </p:spPr>
-      </p:pic>
-    </p:spTree>
-    <p:extLst>
-      <p:ext uri="{BB962C8B-B14F-4D97-AF65-F5344CB8AC3E}">
-        <p14:creationId xmlns:p14="http://schemas.microsoft.com/office/powerpoint/2010/main" val="1758649139"/>
-      </p:ext>
-    </p:extLst>
-  </p:cSld>
-  <p:clrMapOvr>
-    <a:masterClrMapping/>
-  </p:clrMapOvr>
-</p:sld>
-</file>
-
-<file path=ppt/slides/slide20.xml><?xml version="1.0" encoding="utf-8"?>
+<file path=ppt/slides/slide27.xml><?xml version="1.0" encoding="utf-8"?>
 <p:sld xmlns:a="http://schemas.openxmlformats.org/drawingml/2006/main" xmlns:r="http://schemas.openxmlformats.org/officeDocument/2006/relationships" xmlns:p="http://schemas.openxmlformats.org/presentationml/2006/main">
   <p:cSld>
     <p:spTree>
@@ -15229,7 +16281,7 @@
 </p:sld>
 </file>
 
-<file path=ppt/slides/slide21.xml><?xml version="1.0" encoding="utf-8"?>
+<file path=ppt/slides/slide28.xml><?xml version="1.0" encoding="utf-8"?>
 <p:sld xmlns:a="http://schemas.openxmlformats.org/drawingml/2006/main" xmlns:r="http://schemas.openxmlformats.org/officeDocument/2006/relationships" xmlns:p="http://schemas.openxmlformats.org/presentationml/2006/main">
   <p:cSld>
     <p:spTree>
@@ -15321,7 +16373,7 @@
 </p:sld>
 </file>
 
-<file path=ppt/slides/slide22.xml><?xml version="1.0" encoding="utf-8"?>
+<file path=ppt/slides/slide29.xml><?xml version="1.0" encoding="utf-8"?>
 <p:sld xmlns:a="http://schemas.openxmlformats.org/drawingml/2006/main" xmlns:r="http://schemas.openxmlformats.org/officeDocument/2006/relationships" xmlns:p="http://schemas.openxmlformats.org/presentationml/2006/main">
   <p:cSld>
     <p:spTree>
@@ -15422,7 +16474,138 @@
 </p:sld>
 </file>
 
-<file path=ppt/slides/slide23.xml><?xml version="1.0" encoding="utf-8"?>
+<file path=ppt/slides/slide3.xml><?xml version="1.0" encoding="utf-8"?>
+<p:sld xmlns:a="http://schemas.openxmlformats.org/drawingml/2006/main" xmlns:r="http://schemas.openxmlformats.org/officeDocument/2006/relationships" xmlns:p="http://schemas.openxmlformats.org/presentationml/2006/main">
+  <p:cSld>
+    <p:spTree>
+      <p:nvGrpSpPr>
+        <p:cNvPr id="1" name=""/>
+        <p:cNvGrpSpPr/>
+        <p:nvPr/>
+      </p:nvGrpSpPr>
+      <p:grpSpPr>
+        <a:xfrm>
+          <a:off x="0" y="0"/>
+          <a:ext cx="0" cy="0"/>
+          <a:chOff x="0" y="0"/>
+          <a:chExt cx="0" cy="0"/>
+        </a:xfrm>
+      </p:grpSpPr>
+      <p:sp>
+        <p:nvSpPr>
+          <p:cNvPr id="2" name="Title 1"/>
+          <p:cNvSpPr>
+            <a:spLocks noGrp="1"/>
+          </p:cNvSpPr>
+          <p:nvPr>
+            <p:ph type="title"/>
+          </p:nvPr>
+        </p:nvSpPr>
+        <p:spPr/>
+        <p:txBody>
+          <a:bodyPr/>
+          <a:lstStyle/>
+          <a:p>
+            <a:r>
+              <a:rPr lang="en-US" dirty="0" smtClean="0"/>
+              <a:t>Key Operations</a:t>
+            </a:r>
+            <a:endParaRPr lang="en-US" dirty="0"/>
+          </a:p>
+        </p:txBody>
+      </p:sp>
+      <p:sp>
+        <p:nvSpPr>
+          <p:cNvPr id="3" name="Text Placeholder 2"/>
+          <p:cNvSpPr>
+            <a:spLocks noGrp="1"/>
+          </p:cNvSpPr>
+          <p:nvPr>
+            <p:ph type="body" idx="1"/>
+          </p:nvPr>
+        </p:nvSpPr>
+        <p:spPr/>
+        <p:txBody>
+          <a:bodyPr/>
+          <a:lstStyle/>
+          <a:p>
+            <a:pPr fontAlgn="base"/>
+            <a:r>
+              <a:rPr lang="en-US" b="1" dirty="0"/>
+              <a:t>Push</a:t>
+            </a:r>
+            <a:r>
+              <a:rPr lang="en-US" dirty="0"/>
+              <a:t>: Adds an element to the top of the stack.</a:t>
+            </a:r>
+          </a:p>
+          <a:p>
+            <a:pPr fontAlgn="base"/>
+            <a:r>
+              <a:rPr lang="en-US" b="1" dirty="0"/>
+              <a:t>Pop</a:t>
+            </a:r>
+            <a:r>
+              <a:rPr lang="en-US" dirty="0"/>
+              <a:t>: Removes the top element from the stack.</a:t>
+            </a:r>
+          </a:p>
+          <a:p>
+            <a:pPr fontAlgn="base"/>
+            <a:r>
+              <a:rPr lang="en-US" b="1" dirty="0"/>
+              <a:t>Peek</a:t>
+            </a:r>
+            <a:r>
+              <a:rPr lang="en-US" dirty="0"/>
+              <a:t>: Returns the top element without removing it.</a:t>
+            </a:r>
+          </a:p>
+          <a:p>
+            <a:pPr fontAlgn="base"/>
+            <a:r>
+              <a:rPr lang="en-US" b="1" dirty="0" err="1"/>
+              <a:t>IsEmpty</a:t>
+            </a:r>
+            <a:r>
+              <a:rPr lang="en-US" dirty="0"/>
+              <a:t>: Checks if the stack is empty.</a:t>
+            </a:r>
+          </a:p>
+          <a:p>
+            <a:pPr fontAlgn="base"/>
+            <a:r>
+              <a:rPr lang="en-US" b="1" dirty="0" err="1"/>
+              <a:t>IsFull</a:t>
+            </a:r>
+            <a:r>
+              <a:rPr lang="en-US" dirty="0"/>
+              <a:t>: Checks if the stack is full (in case of fixed-size arrays).</a:t>
+            </a:r>
+          </a:p>
+        </p:txBody>
+      </p:sp>
+    </p:spTree>
+    <p:extLst>
+      <p:ext uri="{BB962C8B-B14F-4D97-AF65-F5344CB8AC3E}">
+        <p14:creationId xmlns:p14="http://schemas.microsoft.com/office/powerpoint/2010/main" val="1472110028"/>
+      </p:ext>
+    </p:extLst>
+  </p:cSld>
+  <p:clrMapOvr>
+    <a:masterClrMapping/>
+  </p:clrMapOvr>
+  <p:timing>
+    <p:tnLst>
+      <p:par>
+        <p:cTn id="1" dur="indefinite" restart="never" nodeType="tmRoot"/>
+      </p:par>
+    </p:tnLst>
+  </p:timing>
+</p:sld>
+</file>
+
+<file path=ppt/slides/slide30.xml><?xml version="1.0" encoding="utf-8"?>
 <p:sld xmlns:a="http://schemas.openxmlformats.org/drawingml/2006/main" xmlns:r="http://schemas.openxmlformats.org/officeDocument/2006/relationships" xmlns:p="http://schemas.openxmlformats.org/presentationml/2006/main">
   <p:cSld>
     <p:spTree>
@@ -16077,7 +17260,7 @@
 </p:sld>
 </file>
 
-<file path=ppt/slides/slide24.xml><?xml version="1.0" encoding="utf-8"?>
+<file path=ppt/slides/slide31.xml><?xml version="1.0" encoding="utf-8"?>
 <p:sld xmlns:a="http://schemas.openxmlformats.org/drawingml/2006/main" xmlns:r="http://schemas.openxmlformats.org/officeDocument/2006/relationships" xmlns:p="http://schemas.openxmlformats.org/presentationml/2006/main">
   <p:cSld>
     <p:spTree>
@@ -16202,7 +17385,7 @@
 </p:sld>
 </file>
 
-<file path=ppt/slides/slide25.xml><?xml version="1.0" encoding="utf-8"?>
+<file path=ppt/slides/slide32.xml><?xml version="1.0" encoding="utf-8"?>
 <p:sld xmlns:a="http://schemas.openxmlformats.org/drawingml/2006/main" xmlns:r="http://schemas.openxmlformats.org/officeDocument/2006/relationships" xmlns:p="http://schemas.openxmlformats.org/presentationml/2006/main">
   <p:cSld>
     <p:spTree>
@@ -16292,7 +17475,7 @@
 </p:sld>
 </file>
 
-<file path=ppt/slides/slide26.xml><?xml version="1.0" encoding="utf-8"?>
+<file path=ppt/slides/slide33.xml><?xml version="1.0" encoding="utf-8"?>
 <p:sld xmlns:a="http://schemas.openxmlformats.org/drawingml/2006/main" xmlns:r="http://schemas.openxmlformats.org/officeDocument/2006/relationships" xmlns:p="http://schemas.openxmlformats.org/presentationml/2006/main">
   <p:cSld>
     <p:spTree>
@@ -16408,7 +17591,7 @@
 </p:sld>
 </file>
 
-<file path=ppt/slides/slide27.xml><?xml version="1.0" encoding="utf-8"?>
+<file path=ppt/slides/slide34.xml><?xml version="1.0" encoding="utf-8"?>
 <p:sld xmlns:a="http://schemas.openxmlformats.org/drawingml/2006/main" xmlns:r="http://schemas.openxmlformats.org/officeDocument/2006/relationships" xmlns:p="http://schemas.openxmlformats.org/presentationml/2006/main">
   <p:cSld>
     <p:spTree>
@@ -16534,7 +17717,7 @@
 </p:sld>
 </file>
 
-<file path=ppt/slides/slide28.xml><?xml version="1.0" encoding="utf-8"?>
+<file path=ppt/slides/slide35.xml><?xml version="1.0" encoding="utf-8"?>
 <p:sld xmlns:a="http://schemas.openxmlformats.org/drawingml/2006/main" xmlns:r="http://schemas.openxmlformats.org/officeDocument/2006/relationships" xmlns:p="http://schemas.openxmlformats.org/presentationml/2006/main">
   <p:cSld>
     <p:spTree>
@@ -16652,7 +17835,7 @@
 </p:sld>
 </file>
 
-<file path=ppt/slides/slide29.xml><?xml version="1.0" encoding="utf-8"?>
+<file path=ppt/slides/slide36.xml><?xml version="1.0" encoding="utf-8"?>
 <p:sld xmlns:a="http://schemas.openxmlformats.org/drawingml/2006/main" xmlns:r="http://schemas.openxmlformats.org/officeDocument/2006/relationships" xmlns:p="http://schemas.openxmlformats.org/presentationml/2006/main">
   <p:cSld>
     <p:spTree>
@@ -16766,131 +17949,7 @@
 </p:sld>
 </file>
 
-<file path=ppt/slides/slide3.xml><?xml version="1.0" encoding="utf-8"?>
-<p:sld xmlns:a="http://schemas.openxmlformats.org/drawingml/2006/main" xmlns:r="http://schemas.openxmlformats.org/officeDocument/2006/relationships" xmlns:p="http://schemas.openxmlformats.org/presentationml/2006/main">
-  <p:cSld>
-    <p:spTree>
-      <p:nvGrpSpPr>
-        <p:cNvPr id="1" name=""/>
-        <p:cNvGrpSpPr/>
-        <p:nvPr/>
-      </p:nvGrpSpPr>
-      <p:grpSpPr>
-        <a:xfrm>
-          <a:off x="0" y="0"/>
-          <a:ext cx="0" cy="0"/>
-          <a:chOff x="0" y="0"/>
-          <a:chExt cx="0" cy="0"/>
-        </a:xfrm>
-      </p:grpSpPr>
-      <p:sp>
-        <p:nvSpPr>
-          <p:cNvPr id="2" name="Title 1"/>
-          <p:cNvSpPr>
-            <a:spLocks noGrp="1"/>
-          </p:cNvSpPr>
-          <p:nvPr>
-            <p:ph type="title"/>
-          </p:nvPr>
-        </p:nvSpPr>
-        <p:spPr/>
-        <p:txBody>
-          <a:bodyPr/>
-          <a:lstStyle/>
-          <a:p>
-            <a:r>
-              <a:rPr lang="en-US" dirty="0" smtClean="0"/>
-              <a:t>Key Operations</a:t>
-            </a:r>
-            <a:endParaRPr lang="en-US" dirty="0"/>
-          </a:p>
-        </p:txBody>
-      </p:sp>
-      <p:sp>
-        <p:nvSpPr>
-          <p:cNvPr id="3" name="Text Placeholder 2"/>
-          <p:cNvSpPr>
-            <a:spLocks noGrp="1"/>
-          </p:cNvSpPr>
-          <p:nvPr>
-            <p:ph type="body" idx="1"/>
-          </p:nvPr>
-        </p:nvSpPr>
-        <p:spPr/>
-        <p:txBody>
-          <a:bodyPr/>
-          <a:lstStyle/>
-          <a:p>
-            <a:pPr fontAlgn="base"/>
-            <a:r>
-              <a:rPr lang="en-US" b="1" dirty="0"/>
-              <a:t>Push</a:t>
-            </a:r>
-            <a:r>
-              <a:rPr lang="en-US" dirty="0"/>
-              <a:t>: Adds an element to the top of the stack.</a:t>
-            </a:r>
-          </a:p>
-          <a:p>
-            <a:pPr fontAlgn="base"/>
-            <a:r>
-              <a:rPr lang="en-US" b="1" dirty="0"/>
-              <a:t>Pop</a:t>
-            </a:r>
-            <a:r>
-              <a:rPr lang="en-US" dirty="0"/>
-              <a:t>: Removes the top element from the stack.</a:t>
-            </a:r>
-          </a:p>
-          <a:p>
-            <a:pPr fontAlgn="base"/>
-            <a:r>
-              <a:rPr lang="en-US" b="1" dirty="0"/>
-              <a:t>Peek</a:t>
-            </a:r>
-            <a:r>
-              <a:rPr lang="en-US" dirty="0"/>
-              <a:t>: Returns the top element without removing it.</a:t>
-            </a:r>
-          </a:p>
-          <a:p>
-            <a:pPr fontAlgn="base"/>
-            <a:r>
-              <a:rPr lang="en-US" b="1" dirty="0" err="1"/>
-              <a:t>IsEmpty</a:t>
-            </a:r>
-            <a:r>
-              <a:rPr lang="en-US" dirty="0"/>
-              <a:t>: Checks if the stack is empty.</a:t>
-            </a:r>
-          </a:p>
-          <a:p>
-            <a:pPr fontAlgn="base"/>
-            <a:r>
-              <a:rPr lang="en-US" b="1" dirty="0" err="1"/>
-              <a:t>IsFull</a:t>
-            </a:r>
-            <a:r>
-              <a:rPr lang="en-US" dirty="0"/>
-              <a:t>: Checks if the stack is full (in case of fixed-size arrays).</a:t>
-            </a:r>
-          </a:p>
-        </p:txBody>
-      </p:sp>
-    </p:spTree>
-    <p:extLst>
-      <p:ext uri="{BB962C8B-B14F-4D97-AF65-F5344CB8AC3E}">
-        <p14:creationId xmlns:p14="http://schemas.microsoft.com/office/powerpoint/2010/main" val="1472110028"/>
-      </p:ext>
-    </p:extLst>
-  </p:cSld>
-  <p:clrMapOvr>
-    <a:masterClrMapping/>
-  </p:clrMapOvr>
-</p:sld>
-</file>
-
-<file path=ppt/slides/slide30.xml><?xml version="1.0" encoding="utf-8"?>
+<file path=ppt/slides/slide37.xml><?xml version="1.0" encoding="utf-8"?>
 <p:sld xmlns:a="http://schemas.openxmlformats.org/drawingml/2006/main" xmlns:r="http://schemas.openxmlformats.org/officeDocument/2006/relationships" xmlns:p="http://schemas.openxmlformats.org/presentationml/2006/main">
   <p:cSld>
     <p:spTree>
@@ -16988,7 +18047,7 @@
 </p:sld>
 </file>
 
-<file path=ppt/slides/slide31.xml><?xml version="1.0" encoding="utf-8"?>
+<file path=ppt/slides/slide38.xml><?xml version="1.0" encoding="utf-8"?>
 <p:sld xmlns:a="http://schemas.openxmlformats.org/drawingml/2006/main" xmlns:r="http://schemas.openxmlformats.org/officeDocument/2006/relationships" xmlns:p="http://schemas.openxmlformats.org/presentationml/2006/main">
   <p:cSld>
     <p:spTree>
@@ -17100,7 +18159,7 @@
 </p:sld>
 </file>
 
-<file path=ppt/slides/slide32.xml><?xml version="1.0" encoding="utf-8"?>
+<file path=ppt/slides/slide39.xml><?xml version="1.0" encoding="utf-8"?>
 <p:sld xmlns:a="http://schemas.openxmlformats.org/drawingml/2006/main" xmlns:r="http://schemas.openxmlformats.org/officeDocument/2006/relationships" xmlns:p="http://schemas.openxmlformats.org/presentationml/2006/main">
   <p:cSld>
     <p:spTree>
@@ -17204,7 +18263,114 @@
 </p:sld>
 </file>
 
-<file path=ppt/slides/slide33.xml><?xml version="1.0" encoding="utf-8"?>
+<file path=ppt/slides/slide4.xml><?xml version="1.0" encoding="utf-8"?>
+<p:sld xmlns:a="http://schemas.openxmlformats.org/drawingml/2006/main" xmlns:r="http://schemas.openxmlformats.org/officeDocument/2006/relationships" xmlns:p="http://schemas.openxmlformats.org/presentationml/2006/main">
+  <p:cSld>
+    <p:spTree>
+      <p:nvGrpSpPr>
+        <p:cNvPr id="1" name=""/>
+        <p:cNvGrpSpPr/>
+        <p:nvPr/>
+      </p:nvGrpSpPr>
+      <p:grpSpPr>
+        <a:xfrm>
+          <a:off x="0" y="0"/>
+          <a:ext cx="0" cy="0"/>
+          <a:chOff x="0" y="0"/>
+          <a:chExt cx="0" cy="0"/>
+        </a:xfrm>
+      </p:grpSpPr>
+      <p:sp>
+        <p:nvSpPr>
+          <p:cNvPr id="2" name="Title 1"/>
+          <p:cNvSpPr>
+            <a:spLocks noGrp="1"/>
+          </p:cNvSpPr>
+          <p:nvPr>
+            <p:ph type="title"/>
+          </p:nvPr>
+        </p:nvSpPr>
+        <p:spPr/>
+        <p:txBody>
+          <a:bodyPr/>
+          <a:lstStyle/>
+          <a:p>
+            <a:r>
+              <a:rPr lang="en-US" dirty="0"/>
+              <a:t>Stack push: </a:t>
+            </a:r>
+            <a:r>
+              <a:rPr lang="en-US" dirty="0" smtClean="0"/>
+              <a:t>array implementation</a:t>
+            </a:r>
+            <a:endParaRPr lang="en-US" dirty="0"/>
+          </a:p>
+        </p:txBody>
+      </p:sp>
+      <p:sp>
+        <p:nvSpPr>
+          <p:cNvPr id="3" name="Text Placeholder 2"/>
+          <p:cNvSpPr>
+            <a:spLocks noGrp="1"/>
+          </p:cNvSpPr>
+          <p:nvPr>
+            <p:ph type="body" idx="1"/>
+          </p:nvPr>
+        </p:nvSpPr>
+        <p:spPr/>
+        <p:txBody>
+          <a:bodyPr/>
+          <a:lstStyle/>
+          <a:p>
+            <a:endParaRPr lang="en-US"/>
+          </a:p>
+        </p:txBody>
+      </p:sp>
+      <p:pic>
+        <p:nvPicPr>
+          <p:cNvPr id="4" name="Picture 3"/>
+          <p:cNvPicPr>
+            <a:picLocks noChangeAspect="1"/>
+          </p:cNvPicPr>
+          <p:nvPr/>
+        </p:nvPicPr>
+        <p:blipFill>
+          <a:blip r:embed="rId2"/>
+          <a:stretch>
+            <a:fillRect/>
+          </a:stretch>
+        </p:blipFill>
+        <p:spPr>
+          <a:xfrm>
+            <a:off x="2666521" y="2057208"/>
+            <a:ext cx="6858957" cy="2743583"/>
+          </a:xfrm>
+          <a:prstGeom prst="rect">
+            <a:avLst/>
+          </a:prstGeom>
+        </p:spPr>
+      </p:pic>
+    </p:spTree>
+    <p:extLst>
+      <p:ext uri="{BB962C8B-B14F-4D97-AF65-F5344CB8AC3E}">
+        <p14:creationId xmlns:p14="http://schemas.microsoft.com/office/powerpoint/2010/main" val="332655180"/>
+      </p:ext>
+    </p:extLst>
+  </p:cSld>
+  <p:clrMapOvr>
+    <a:masterClrMapping/>
+  </p:clrMapOvr>
+  <p:timing>
+    <p:tnLst>
+      <p:par>
+        <p:cTn id="1" dur="indefinite" restart="never" nodeType="tmRoot"/>
+      </p:par>
+    </p:tnLst>
+  </p:timing>
+</p:sld>
+</file>
+
+<file path=ppt/slides/slide40.xml><?xml version="1.0" encoding="utf-8"?>
 <p:sld xmlns:a="http://schemas.openxmlformats.org/drawingml/2006/main" xmlns:r="http://schemas.openxmlformats.org/officeDocument/2006/relationships" xmlns:p="http://schemas.openxmlformats.org/presentationml/2006/main">
   <p:cSld>
     <p:spTree>
@@ -17511,7 +18677,7 @@
 </p:sld>
 </file>
 
-<file path=ppt/slides/slide34.xml><?xml version="1.0" encoding="utf-8"?>
+<file path=ppt/slides/slide41.xml><?xml version="1.0" encoding="utf-8"?>
 <p:sld xmlns:a="http://schemas.openxmlformats.org/drawingml/2006/main" xmlns:r="http://schemas.openxmlformats.org/officeDocument/2006/relationships" xmlns:p="http://schemas.openxmlformats.org/presentationml/2006/main">
   <p:cSld>
     <p:spTree>
@@ -17713,7 +18879,7 @@
 </p:sld>
 </file>
 
-<file path=ppt/slides/slide35.xml><?xml version="1.0" encoding="utf-8"?>
+<file path=ppt/slides/slide42.xml><?xml version="1.0" encoding="utf-8"?>
 <p:sld xmlns:a="http://schemas.openxmlformats.org/drawingml/2006/main" xmlns:r="http://schemas.openxmlformats.org/officeDocument/2006/relationships" xmlns:p="http://schemas.openxmlformats.org/presentationml/2006/main">
   <p:cSld>
     <p:spTree>
@@ -17816,7 +18982,7 @@
 </p:sld>
 </file>
 
-<file path=ppt/slides/slide36.xml><?xml version="1.0" encoding="utf-8"?>
+<file path=ppt/slides/slide43.xml><?xml version="1.0" encoding="utf-8"?>
 <p:sld xmlns:a="http://schemas.openxmlformats.org/drawingml/2006/main" xmlns:r="http://schemas.openxmlformats.org/officeDocument/2006/relationships" xmlns:p="http://schemas.openxmlformats.org/presentationml/2006/main">
   <p:cSld>
     <p:spTree>
@@ -17978,7 +19144,7 @@
 </p:sld>
 </file>
 
-<file path=ppt/slides/slide37.xml><?xml version="1.0" encoding="utf-8"?>
+<file path=ppt/slides/slide44.xml><?xml version="1.0" encoding="utf-8"?>
 <p:sld xmlns:a="http://schemas.openxmlformats.org/drawingml/2006/main" xmlns:r="http://schemas.openxmlformats.org/officeDocument/2006/relationships" xmlns:p="http://schemas.openxmlformats.org/presentationml/2006/main">
   <p:cSld>
     <p:spTree>
@@ -18070,7 +19236,7 @@
 </p:sld>
 </file>
 
-<file path=ppt/slides/slide38.xml><?xml version="1.0" encoding="utf-8"?>
+<file path=ppt/slides/slide45.xml><?xml version="1.0" encoding="utf-8"?>
 <p:sld xmlns:a="http://schemas.openxmlformats.org/drawingml/2006/main" xmlns:r="http://schemas.openxmlformats.org/officeDocument/2006/relationships" xmlns:p="http://schemas.openxmlformats.org/presentationml/2006/main">
   <p:cSld>
     <p:spTree>
@@ -18253,7 +19419,7 @@
 </p:sld>
 </file>
 
-<file path=ppt/slides/slide39.xml><?xml version="1.0" encoding="utf-8"?>
+<file path=ppt/slides/slide46.xml><?xml version="1.0" encoding="utf-8"?>
 <p:sld xmlns:a="http://schemas.openxmlformats.org/drawingml/2006/main" xmlns:r="http://schemas.openxmlformats.org/officeDocument/2006/relationships" xmlns:p="http://schemas.openxmlformats.org/presentationml/2006/main">
   <p:cSld>
     <p:spTree>
@@ -18365,7 +19531,7 @@
 </p:sld>
 </file>
 
-<file path=ppt/slides/slide4.xml><?xml version="1.0" encoding="utf-8"?>
+<file path=ppt/slides/slide47.xml><?xml version="1.0" encoding="utf-8"?>
 <p:sld xmlns:a="http://schemas.openxmlformats.org/drawingml/2006/main" xmlns:r="http://schemas.openxmlformats.org/officeDocument/2006/relationships" xmlns:p="http://schemas.openxmlformats.org/presentationml/2006/main">
   <p:cSld>
     <p:spTree>
@@ -18397,15 +19563,7 @@
           <a:bodyPr/>
           <a:lstStyle/>
           <a:p>
-            <a:r>
-              <a:rPr lang="en-US" dirty="0"/>
-              <a:t>Stack push: </a:t>
-            </a:r>
-            <a:r>
-              <a:rPr lang="en-US" dirty="0" smtClean="0"/>
-              <a:t>array implementation</a:t>
-            </a:r>
-            <a:endParaRPr lang="en-US" dirty="0"/>
+            <a:endParaRPr lang="en-US"/>
           </a:p>
         </p:txBody>
       </p:sp>
@@ -18424,98 +19582,6 @@
           <a:bodyPr/>
           <a:lstStyle/>
           <a:p>
-            <a:endParaRPr lang="en-US"/>
-          </a:p>
-        </p:txBody>
-      </p:sp>
-      <p:pic>
-        <p:nvPicPr>
-          <p:cNvPr id="4" name="Picture 3"/>
-          <p:cNvPicPr>
-            <a:picLocks noChangeAspect="1"/>
-          </p:cNvPicPr>
-          <p:nvPr/>
-        </p:nvPicPr>
-        <p:blipFill>
-          <a:blip r:embed="rId2"/>
-          <a:stretch>
-            <a:fillRect/>
-          </a:stretch>
-        </p:blipFill>
-        <p:spPr>
-          <a:xfrm>
-            <a:off x="2666521" y="2057208"/>
-            <a:ext cx="6858957" cy="2743583"/>
-          </a:xfrm>
-          <a:prstGeom prst="rect">
-            <a:avLst/>
-          </a:prstGeom>
-        </p:spPr>
-      </p:pic>
-    </p:spTree>
-    <p:extLst>
-      <p:ext uri="{BB962C8B-B14F-4D97-AF65-F5344CB8AC3E}">
-        <p14:creationId xmlns:p14="http://schemas.microsoft.com/office/powerpoint/2010/main" val="332655180"/>
-      </p:ext>
-    </p:extLst>
-  </p:cSld>
-  <p:clrMapOvr>
-    <a:masterClrMapping/>
-  </p:clrMapOvr>
-</p:sld>
-</file>
-
-<file path=ppt/slides/slide40.xml><?xml version="1.0" encoding="utf-8"?>
-<p:sld xmlns:a="http://schemas.openxmlformats.org/drawingml/2006/main" xmlns:r="http://schemas.openxmlformats.org/officeDocument/2006/relationships" xmlns:p="http://schemas.openxmlformats.org/presentationml/2006/main">
-  <p:cSld>
-    <p:spTree>
-      <p:nvGrpSpPr>
-        <p:cNvPr id="1" name=""/>
-        <p:cNvGrpSpPr/>
-        <p:nvPr/>
-      </p:nvGrpSpPr>
-      <p:grpSpPr>
-        <a:xfrm>
-          <a:off x="0" y="0"/>
-          <a:ext cx="0" cy="0"/>
-          <a:chOff x="0" y="0"/>
-          <a:chExt cx="0" cy="0"/>
-        </a:xfrm>
-      </p:grpSpPr>
-      <p:sp>
-        <p:nvSpPr>
-          <p:cNvPr id="2" name="Title 1"/>
-          <p:cNvSpPr>
-            <a:spLocks noGrp="1"/>
-          </p:cNvSpPr>
-          <p:nvPr>
-            <p:ph type="title"/>
-          </p:nvPr>
-        </p:nvSpPr>
-        <p:spPr/>
-        <p:txBody>
-          <a:bodyPr/>
-          <a:lstStyle/>
-          <a:p>
-            <a:endParaRPr lang="en-US"/>
-          </a:p>
-        </p:txBody>
-      </p:sp>
-      <p:sp>
-        <p:nvSpPr>
-          <p:cNvPr id="3" name="Text Placeholder 2"/>
-          <p:cNvSpPr>
-            <a:spLocks noGrp="1"/>
-          </p:cNvSpPr>
-          <p:nvPr>
-            <p:ph type="body" idx="1"/>
-          </p:nvPr>
-        </p:nvSpPr>
-        <p:spPr/>
-        <p:txBody>
-          <a:bodyPr/>
-          <a:lstStyle/>
-          <a:p>
             <a:r>
               <a:rPr lang="en-US" dirty="0"/>
               <a:t>Backtracking is used to explore all potential valid combinations of parentheses</a:t>
@@ -18564,7 +19630,7 @@
 </p:sld>
 </file>
 
-<file path=ppt/slides/slide41.xml><?xml version="1.0" encoding="utf-8"?>
+<file path=ppt/slides/slide48.xml><?xml version="1.0" encoding="utf-8"?>
 <p:sld xmlns:a="http://schemas.openxmlformats.org/drawingml/2006/main" xmlns:r="http://schemas.openxmlformats.org/officeDocument/2006/relationships" xmlns:p="http://schemas.openxmlformats.org/presentationml/2006/main">
   <p:cSld>
     <p:spTree>
@@ -18684,7 +19750,7 @@
 </p:sld>
 </file>
 
-<file path=ppt/slides/slide42.xml><?xml version="1.0" encoding="utf-8"?>
+<file path=ppt/slides/slide49.xml><?xml version="1.0" encoding="utf-8"?>
 <p:sld xmlns:a="http://schemas.openxmlformats.org/drawingml/2006/main" xmlns:r="http://schemas.openxmlformats.org/officeDocument/2006/relationships" xmlns:p="http://schemas.openxmlformats.org/presentationml/2006/main">
   <p:cSld>
     <p:spTree>
@@ -18870,7 +19936,114 @@
 </p:sld>
 </file>
 
-<file path=ppt/slides/slide43.xml><?xml version="1.0" encoding="utf-8"?>
+<file path=ppt/slides/slide5.xml><?xml version="1.0" encoding="utf-8"?>
+<p:sld xmlns:a="http://schemas.openxmlformats.org/drawingml/2006/main" xmlns:r="http://schemas.openxmlformats.org/officeDocument/2006/relationships" xmlns:p="http://schemas.openxmlformats.org/presentationml/2006/main">
+  <p:cSld>
+    <p:spTree>
+      <p:nvGrpSpPr>
+        <p:cNvPr id="1" name=""/>
+        <p:cNvGrpSpPr/>
+        <p:nvPr/>
+      </p:nvGrpSpPr>
+      <p:grpSpPr>
+        <a:xfrm>
+          <a:off x="0" y="0"/>
+          <a:ext cx="0" cy="0"/>
+          <a:chOff x="0" y="0"/>
+          <a:chExt cx="0" cy="0"/>
+        </a:xfrm>
+      </p:grpSpPr>
+      <p:sp>
+        <p:nvSpPr>
+          <p:cNvPr id="2" name="Title 1"/>
+          <p:cNvSpPr>
+            <a:spLocks noGrp="1"/>
+          </p:cNvSpPr>
+          <p:nvPr>
+            <p:ph type="title"/>
+          </p:nvPr>
+        </p:nvSpPr>
+        <p:spPr/>
+        <p:txBody>
+          <a:bodyPr/>
+          <a:lstStyle/>
+          <a:p>
+            <a:r>
+              <a:rPr lang="en-US" dirty="0"/>
+              <a:t>Stack pop: </a:t>
+            </a:r>
+            <a:r>
+              <a:rPr lang="en-US" dirty="0" smtClean="0"/>
+              <a:t>array implementation</a:t>
+            </a:r>
+            <a:endParaRPr lang="en-US" dirty="0"/>
+          </a:p>
+        </p:txBody>
+      </p:sp>
+      <p:pic>
+        <p:nvPicPr>
+          <p:cNvPr id="4" name="Picture 3"/>
+          <p:cNvPicPr>
+            <a:picLocks noChangeAspect="1"/>
+          </p:cNvPicPr>
+          <p:nvPr/>
+        </p:nvPicPr>
+        <p:blipFill>
+          <a:blip r:embed="rId2"/>
+          <a:stretch>
+            <a:fillRect/>
+          </a:stretch>
+        </p:blipFill>
+        <p:spPr>
+          <a:xfrm>
+            <a:off x="2542679" y="2323946"/>
+            <a:ext cx="7106642" cy="2210108"/>
+          </a:xfrm>
+          <a:prstGeom prst="rect">
+            <a:avLst/>
+          </a:prstGeom>
+        </p:spPr>
+      </p:pic>
+      <p:sp>
+        <p:nvSpPr>
+          <p:cNvPr id="3" name="Text Placeholder 2"/>
+          <p:cNvSpPr>
+            <a:spLocks noGrp="1"/>
+          </p:cNvSpPr>
+          <p:nvPr>
+            <p:ph type="body" idx="1"/>
+          </p:nvPr>
+        </p:nvSpPr>
+        <p:spPr/>
+        <p:txBody>
+          <a:bodyPr/>
+          <a:lstStyle/>
+          <a:p>
+            <a:endParaRPr lang="en-US" dirty="0"/>
+          </a:p>
+        </p:txBody>
+      </p:sp>
+    </p:spTree>
+    <p:extLst>
+      <p:ext uri="{BB962C8B-B14F-4D97-AF65-F5344CB8AC3E}">
+        <p14:creationId xmlns:p14="http://schemas.microsoft.com/office/powerpoint/2010/main" val="3876831319"/>
+      </p:ext>
+    </p:extLst>
+  </p:cSld>
+  <p:clrMapOvr>
+    <a:masterClrMapping/>
+  </p:clrMapOvr>
+  <p:timing>
+    <p:tnLst>
+      <p:par>
+        <p:cTn id="1" dur="indefinite" restart="never" nodeType="tmRoot"/>
+      </p:par>
+    </p:tnLst>
+  </p:timing>
+</p:sld>
+</file>
+
+<file path=ppt/slides/slide50.xml><?xml version="1.0" encoding="utf-8"?>
 <p:sld xmlns:a="http://schemas.openxmlformats.org/drawingml/2006/main" xmlns:r="http://schemas.openxmlformats.org/officeDocument/2006/relationships" xmlns:p="http://schemas.openxmlformats.org/presentationml/2006/main">
   <p:cSld>
     <p:spTree>
@@ -18991,15 +20164,7 @@
             <a:pPr indent="-457200"/>
             <a:r>
               <a:rPr lang="en-US" dirty="0" smtClean="0"/>
-              <a:t>Robert </a:t>
-            </a:r>
-            <a:r>
-              <a:rPr lang="en-US" dirty="0" smtClean="0"/>
-              <a:t>Sedgewick - Algorithms in C++, Parts 1-4_ Fundamentals, Data Structure, Sorting, Searching, Third Edition-Addison-Wesley Professional (1998</a:t>
-            </a:r>
-            <a:r>
-              <a:rPr lang="en-US" dirty="0" smtClean="0"/>
-              <a:t>).</a:t>
+              <a:t>Robert Sedgewick - Algorithms in C++, Parts 1-4_ Fundamentals, Data Structure, Sorting, Searching, Third Edition-Addison-Wesley Professional (1998).</a:t>
             </a:r>
           </a:p>
           <a:p>
@@ -19029,106 +20194,6 @@
       </p:par>
     </p:tnLst>
   </p:timing>
-</p:sld>
-</file>
-
-<file path=ppt/slides/slide5.xml><?xml version="1.0" encoding="utf-8"?>
-<p:sld xmlns:a="http://schemas.openxmlformats.org/drawingml/2006/main" xmlns:r="http://schemas.openxmlformats.org/officeDocument/2006/relationships" xmlns:p="http://schemas.openxmlformats.org/presentationml/2006/main">
-  <p:cSld>
-    <p:spTree>
-      <p:nvGrpSpPr>
-        <p:cNvPr id="1" name=""/>
-        <p:cNvGrpSpPr/>
-        <p:nvPr/>
-      </p:nvGrpSpPr>
-      <p:grpSpPr>
-        <a:xfrm>
-          <a:off x="0" y="0"/>
-          <a:ext cx="0" cy="0"/>
-          <a:chOff x="0" y="0"/>
-          <a:chExt cx="0" cy="0"/>
-        </a:xfrm>
-      </p:grpSpPr>
-      <p:sp>
-        <p:nvSpPr>
-          <p:cNvPr id="2" name="Title 1"/>
-          <p:cNvSpPr>
-            <a:spLocks noGrp="1"/>
-          </p:cNvSpPr>
-          <p:nvPr>
-            <p:ph type="title"/>
-          </p:nvPr>
-        </p:nvSpPr>
-        <p:spPr/>
-        <p:txBody>
-          <a:bodyPr/>
-          <a:lstStyle/>
-          <a:p>
-            <a:r>
-              <a:rPr lang="en-US" dirty="0"/>
-              <a:t>Stack pop: </a:t>
-            </a:r>
-            <a:r>
-              <a:rPr lang="en-US" dirty="0" smtClean="0"/>
-              <a:t>array implementation</a:t>
-            </a:r>
-            <a:endParaRPr lang="en-US" dirty="0"/>
-          </a:p>
-        </p:txBody>
-      </p:sp>
-      <p:pic>
-        <p:nvPicPr>
-          <p:cNvPr id="4" name="Picture 3"/>
-          <p:cNvPicPr>
-            <a:picLocks noChangeAspect="1"/>
-          </p:cNvPicPr>
-          <p:nvPr/>
-        </p:nvPicPr>
-        <p:blipFill>
-          <a:blip r:embed="rId2"/>
-          <a:stretch>
-            <a:fillRect/>
-          </a:stretch>
-        </p:blipFill>
-        <p:spPr>
-          <a:xfrm>
-            <a:off x="2542679" y="2323946"/>
-            <a:ext cx="7106642" cy="2210108"/>
-          </a:xfrm>
-          <a:prstGeom prst="rect">
-            <a:avLst/>
-          </a:prstGeom>
-        </p:spPr>
-      </p:pic>
-      <p:sp>
-        <p:nvSpPr>
-          <p:cNvPr id="3" name="Text Placeholder 2"/>
-          <p:cNvSpPr>
-            <a:spLocks noGrp="1"/>
-          </p:cNvSpPr>
-          <p:nvPr>
-            <p:ph type="body" idx="1"/>
-          </p:nvPr>
-        </p:nvSpPr>
-        <p:spPr/>
-        <p:txBody>
-          <a:bodyPr/>
-          <a:lstStyle/>
-          <a:p>
-            <a:endParaRPr lang="en-US" dirty="0"/>
-          </a:p>
-        </p:txBody>
-      </p:sp>
-    </p:spTree>
-    <p:extLst>
-      <p:ext uri="{BB962C8B-B14F-4D97-AF65-F5344CB8AC3E}">
-        <p14:creationId xmlns:p14="http://schemas.microsoft.com/office/powerpoint/2010/main" val="3876831319"/>
-      </p:ext>
-    </p:extLst>
-  </p:cSld>
-  <p:clrMapOvr>
-    <a:masterClrMapping/>
-  </p:clrMapOvr>
 </p:sld>
 </file>
 
@@ -19260,6 +20325,13 @@
   <p:clrMapOvr>
     <a:masterClrMapping/>
   </p:clrMapOvr>
+  <p:timing>
+    <p:tnLst>
+      <p:par>
+        <p:cTn id="1" dur="indefinite" restart="never" nodeType="tmRoot"/>
+      </p:par>
+    </p:tnLst>
+  </p:timing>
 </p:sld>
 </file>
 
@@ -19363,6 +20435,13 @@
   <p:clrMapOvr>
     <a:masterClrMapping/>
   </p:clrMapOvr>
+  <p:timing>
+    <p:tnLst>
+      <p:par>
+        <p:cTn id="1" dur="indefinite" restart="never" nodeType="tmRoot"/>
+      </p:par>
+    </p:tnLst>
+  </p:timing>
 </p:sld>
 </file>
 
@@ -19458,6 +20537,13 @@
   <p:clrMapOvr>
     <a:masterClrMapping/>
   </p:clrMapOvr>
+  <p:timing>
+    <p:tnLst>
+      <p:par>
+        <p:cTn id="1" dur="indefinite" restart="never" nodeType="tmRoot"/>
+      </p:par>
+    </p:tnLst>
+  </p:timing>
 </p:sld>
 </file>
 
@@ -19494,50 +20580,53 @@
           <a:lstStyle/>
           <a:p>
             <a:r>
-              <a:rPr lang="en-US" dirty="0" smtClean="0"/>
-              <a:t>Task</a:t>
-            </a:r>
-            <a:endParaRPr lang="en-US" dirty="0"/>
+              <a:rPr lang="en-US" dirty="0"/>
+              <a:t>Stack: resizing-array implementation</a:t>
+            </a:r>
           </a:p>
         </p:txBody>
       </p:sp>
-      <p:sp>
-        <p:nvSpPr>
-          <p:cNvPr id="3" name="Text Placeholder 2"/>
-          <p:cNvSpPr>
-            <a:spLocks noGrp="1"/>
-          </p:cNvSpPr>
-          <p:nvPr>
-            <p:ph type="body" idx="1"/>
-          </p:nvPr>
-        </p:nvSpPr>
-        <p:spPr/>
-        <p:txBody>
-          <a:bodyPr/>
-          <a:lstStyle/>
-          <a:p>
-            <a:r>
-              <a:rPr lang="en-US" dirty="0"/>
-              <a:t>Reverse </a:t>
-            </a:r>
-            <a:r>
-              <a:rPr lang="en-US" dirty="0" smtClean="0"/>
-              <a:t>a string using stack </a:t>
-            </a:r>
-            <a:endParaRPr lang="en-US" dirty="0"/>
-          </a:p>
-        </p:txBody>
-      </p:sp>
+      <p:pic>
+        <p:nvPicPr>
+          <p:cNvPr id="4" name="Picture 3"/>
+          <p:cNvPicPr>
+            <a:picLocks noChangeAspect="1"/>
+          </p:cNvPicPr>
+          <p:nvPr/>
+        </p:nvPicPr>
+        <p:blipFill>
+          <a:blip r:embed="rId2"/>
+          <a:stretch>
+            <a:fillRect/>
+          </a:stretch>
+        </p:blipFill>
+        <p:spPr>
+          <a:xfrm>
+            <a:off x="2379248" y="1525574"/>
+            <a:ext cx="6995999" cy="4786736"/>
+          </a:xfrm>
+          <a:prstGeom prst="rect">
+            <a:avLst/>
+          </a:prstGeom>
+        </p:spPr>
+      </p:pic>
     </p:spTree>
     <p:extLst>
       <p:ext uri="{BB962C8B-B14F-4D97-AF65-F5344CB8AC3E}">
-        <p14:creationId xmlns:p14="http://schemas.microsoft.com/office/powerpoint/2010/main" val="301942146"/>
+        <p14:creationId xmlns:p14="http://schemas.microsoft.com/office/powerpoint/2010/main" val="1940088534"/>
       </p:ext>
     </p:extLst>
   </p:cSld>
   <p:clrMapOvr>
     <a:masterClrMapping/>
   </p:clrMapOvr>
+  <p:timing>
+    <p:tnLst>
+      <p:par>
+        <p:cTn id="1" dur="indefinite" restart="never" nodeType="tmRoot"/>
+      </p:par>
+    </p:tnLst>
+  </p:timing>
 </p:sld>
 </file>
 

</xml_diff>